<commit_message>
added file config by my_parser
</commit_message>
<xml_diff>
--- a/scraping_parsing project/web scraping_parsing.pptx
+++ b/scraping_parsing project/web scraping_parsing.pptx
@@ -848,7 +848,7 @@
           <a:p>
             <a:fld id="{D4448603-A256-4D7B-9259-CDBAFBC6E323}" type="datetimeFigureOut">
               <a:rPr lang="ru-RU" smtClean="0"/>
-              <a:t>22.10.2021</a:t>
+              <a:t>25.10.2021</a:t>
             </a:fld>
             <a:endParaRPr lang="ru-RU"/>
           </a:p>
@@ -1099,7 +1099,7 @@
           <a:p>
             <a:fld id="{D4448603-A256-4D7B-9259-CDBAFBC6E323}" type="datetimeFigureOut">
               <a:rPr lang="ru-RU" smtClean="0"/>
-              <a:t>22.10.2021</a:t>
+              <a:t>25.10.2021</a:t>
             </a:fld>
             <a:endParaRPr lang="ru-RU"/>
           </a:p>
@@ -1413,7 +1413,7 @@
           <a:p>
             <a:fld id="{D4448603-A256-4D7B-9259-CDBAFBC6E323}" type="datetimeFigureOut">
               <a:rPr lang="ru-RU" smtClean="0"/>
-              <a:t>22.10.2021</a:t>
+              <a:t>25.10.2021</a:t>
             </a:fld>
             <a:endParaRPr lang="ru-RU"/>
           </a:p>
@@ -1754,7 +1754,7 @@
           <a:p>
             <a:fld id="{D4448603-A256-4D7B-9259-CDBAFBC6E323}" type="datetimeFigureOut">
               <a:rPr lang="ru-RU" smtClean="0"/>
-              <a:t>22.10.2021</a:t>
+              <a:t>25.10.2021</a:t>
             </a:fld>
             <a:endParaRPr lang="ru-RU"/>
           </a:p>
@@ -2068,7 +2068,7 @@
           <a:p>
             <a:fld id="{D4448603-A256-4D7B-9259-CDBAFBC6E323}" type="datetimeFigureOut">
               <a:rPr lang="ru-RU" smtClean="0"/>
-              <a:t>22.10.2021</a:t>
+              <a:t>25.10.2021</a:t>
             </a:fld>
             <a:endParaRPr lang="ru-RU"/>
           </a:p>
@@ -2461,7 +2461,7 @@
           <a:p>
             <a:fld id="{D4448603-A256-4D7B-9259-CDBAFBC6E323}" type="datetimeFigureOut">
               <a:rPr lang="ru-RU" smtClean="0"/>
-              <a:t>22.10.2021</a:t>
+              <a:t>25.10.2021</a:t>
             </a:fld>
             <a:endParaRPr lang="ru-RU"/>
           </a:p>
@@ -2631,7 +2631,7 @@
           <a:p>
             <a:fld id="{D4448603-A256-4D7B-9259-CDBAFBC6E323}" type="datetimeFigureOut">
               <a:rPr lang="ru-RU" smtClean="0"/>
-              <a:t>22.10.2021</a:t>
+              <a:t>25.10.2021</a:t>
             </a:fld>
             <a:endParaRPr lang="ru-RU"/>
           </a:p>
@@ -2811,7 +2811,7 @@
           <a:p>
             <a:fld id="{D4448603-A256-4D7B-9259-CDBAFBC6E323}" type="datetimeFigureOut">
               <a:rPr lang="ru-RU" smtClean="0"/>
-              <a:t>22.10.2021</a:t>
+              <a:t>25.10.2021</a:t>
             </a:fld>
             <a:endParaRPr lang="ru-RU"/>
           </a:p>
@@ -2987,7 +2987,7 @@
           <a:p>
             <a:fld id="{D4448603-A256-4D7B-9259-CDBAFBC6E323}" type="datetimeFigureOut">
               <a:rPr lang="ru-RU" smtClean="0"/>
-              <a:t>22.10.2021</a:t>
+              <a:t>25.10.2021</a:t>
             </a:fld>
             <a:endParaRPr lang="ru-RU"/>
           </a:p>
@@ -3234,7 +3234,7 @@
           <a:p>
             <a:fld id="{D4448603-A256-4D7B-9259-CDBAFBC6E323}" type="datetimeFigureOut">
               <a:rPr lang="ru-RU" smtClean="0"/>
-              <a:t>22.10.2021</a:t>
+              <a:t>25.10.2021</a:t>
             </a:fld>
             <a:endParaRPr lang="ru-RU"/>
           </a:p>
@@ -3466,7 +3466,7 @@
           <a:p>
             <a:fld id="{D4448603-A256-4D7B-9259-CDBAFBC6E323}" type="datetimeFigureOut">
               <a:rPr lang="ru-RU" smtClean="0"/>
-              <a:t>22.10.2021</a:t>
+              <a:t>25.10.2021</a:t>
             </a:fld>
             <a:endParaRPr lang="ru-RU"/>
           </a:p>
@@ -3840,7 +3840,7 @@
           <a:p>
             <a:fld id="{D4448603-A256-4D7B-9259-CDBAFBC6E323}" type="datetimeFigureOut">
               <a:rPr lang="ru-RU" smtClean="0"/>
-              <a:t>22.10.2021</a:t>
+              <a:t>25.10.2021</a:t>
             </a:fld>
             <a:endParaRPr lang="ru-RU"/>
           </a:p>
@@ -3963,7 +3963,7 @@
           <a:p>
             <a:fld id="{D4448603-A256-4D7B-9259-CDBAFBC6E323}" type="datetimeFigureOut">
               <a:rPr lang="ru-RU" smtClean="0"/>
-              <a:t>22.10.2021</a:t>
+              <a:t>25.10.2021</a:t>
             </a:fld>
             <a:endParaRPr lang="ru-RU"/>
           </a:p>
@@ -4058,7 +4058,7 @@
           <a:p>
             <a:fld id="{D4448603-A256-4D7B-9259-CDBAFBC6E323}" type="datetimeFigureOut">
               <a:rPr lang="ru-RU" smtClean="0"/>
-              <a:t>22.10.2021</a:t>
+              <a:t>25.10.2021</a:t>
             </a:fld>
             <a:endParaRPr lang="ru-RU"/>
           </a:p>
@@ -4313,7 +4313,7 @@
           <a:p>
             <a:fld id="{D4448603-A256-4D7B-9259-CDBAFBC6E323}" type="datetimeFigureOut">
               <a:rPr lang="ru-RU" smtClean="0"/>
-              <a:t>22.10.2021</a:t>
+              <a:t>25.10.2021</a:t>
             </a:fld>
             <a:endParaRPr lang="ru-RU"/>
           </a:p>
@@ -4576,7 +4576,7 @@
           <a:p>
             <a:fld id="{D4448603-A256-4D7B-9259-CDBAFBC6E323}" type="datetimeFigureOut">
               <a:rPr lang="ru-RU" smtClean="0"/>
-              <a:t>22.10.2021</a:t>
+              <a:t>25.10.2021</a:t>
             </a:fld>
             <a:endParaRPr lang="ru-RU"/>
           </a:p>
@@ -5319,7 +5319,7 @@
           <a:p>
             <a:fld id="{D4448603-A256-4D7B-9259-CDBAFBC6E323}" type="datetimeFigureOut">
               <a:rPr lang="ru-RU" smtClean="0"/>
-              <a:t>22.10.2021</a:t>
+              <a:t>25.10.2021</a:t>
             </a:fld>
             <a:endParaRPr lang="ru-RU"/>
           </a:p>
@@ -6981,11 +6981,18 @@
               <a:t>Функция </a:t>
             </a:r>
             <a:r>
+              <a:rPr lang="en-US" sz="1600" b="1" dirty="0" smtClean="0">
+                <a:latin typeface="Calibri" panose="020F0502020204030204" pitchFamily="34" charset="0"/>
+                <a:cs typeface="Calibri" panose="020F0502020204030204" pitchFamily="34" charset="0"/>
+              </a:rPr>
+              <a:t>parse</a:t>
+            </a:r>
+            <a:r>
               <a:rPr lang="en-US" sz="1600" dirty="0" smtClean="0">
                 <a:latin typeface="Calibri" panose="020F0502020204030204" pitchFamily="34" charset="0"/>
                 <a:cs typeface="Calibri" panose="020F0502020204030204" pitchFamily="34" charset="0"/>
               </a:rPr>
-              <a:t>parse </a:t>
+              <a:t> </a:t>
             </a:r>
             <a:r>
               <a:rPr lang="ru-RU" sz="1600" dirty="0" smtClean="0">
@@ -10797,7 +10804,28 @@
                 <a:latin typeface="Calibri" panose="020F0502020204030204" pitchFamily="34" charset="0"/>
                 <a:cs typeface="Calibri" panose="020F0502020204030204" pitchFamily="34" charset="0"/>
               </a:rPr>
-              <a:t>на консоль динамически обновляемый индикатор </a:t>
+              <a:t>на консоль динамически </a:t>
+            </a:r>
+            <a:r>
+              <a:rPr lang="ru-RU" sz="2000" dirty="0" smtClean="0">
+                <a:latin typeface="Calibri" panose="020F0502020204030204" pitchFamily="34" charset="0"/>
+                <a:cs typeface="Calibri" panose="020F0502020204030204" pitchFamily="34" charset="0"/>
+              </a:rPr>
+              <a:t>обновляем</a:t>
+            </a:r>
+            <a:r>
+              <a:rPr lang="ru-RU" sz="2000" dirty="0" smtClean="0">
+                <a:latin typeface="Calibri" panose="020F0502020204030204" pitchFamily="34" charset="0"/>
+                <a:cs typeface="Calibri" panose="020F0502020204030204" pitchFamily="34" charset="0"/>
+              </a:rPr>
+              <a:t>ого</a:t>
+            </a:r>
+            <a:r>
+              <a:rPr lang="ru-RU" sz="2000" dirty="0" smtClean="0">
+                <a:latin typeface="Calibri" panose="020F0502020204030204" pitchFamily="34" charset="0"/>
+                <a:cs typeface="Calibri" panose="020F0502020204030204" pitchFamily="34" charset="0"/>
+              </a:rPr>
+              <a:t> индикатора </a:t>
             </a:r>
             <a:r>
               <a:rPr lang="ru-RU" sz="2000" dirty="0" smtClean="0">
@@ -11666,14 +11694,7 @@
                 <a:latin typeface="Calibri" panose="020F0502020204030204" pitchFamily="34" charset="0"/>
                 <a:cs typeface="Calibri" panose="020F0502020204030204" pitchFamily="34" charset="0"/>
               </a:rPr>
-              <a:t>Beautiful </a:t>
-            </a:r>
-            <a:r>
-              <a:rPr lang="en-US" sz="2000" dirty="0" smtClean="0">
-                <a:latin typeface="Calibri" panose="020F0502020204030204" pitchFamily="34" charset="0"/>
-                <a:cs typeface="Calibri" panose="020F0502020204030204" pitchFamily="34" charset="0"/>
-              </a:rPr>
-              <a:t>Soup, </a:t>
+              <a:t>Beautiful Soup, </a:t>
             </a:r>
             <a:r>
               <a:rPr lang="ru-RU" sz="2000" dirty="0" err="1" smtClean="0">

</xml_diff>

<commit_message>
added changes in parser project
</commit_message>
<xml_diff>
--- a/scraping_parsing project/web scraping_parsing.pptx
+++ b/scraping_parsing project/web scraping_parsing.pptx
@@ -848,9 +848,9 @@
           <a:p>
             <a:fld id="{D4448603-A256-4D7B-9259-CDBAFBC6E323}" type="datetimeFigureOut">
               <a:rPr lang="ru-RU" smtClean="0"/>
-              <a:t>25.10.2021</a:t>
+              <a:t>01.11.2021</a:t>
             </a:fld>
-            <a:endParaRPr lang="ru-RU"/>
+            <a:endParaRPr lang="ru-RU" dirty="0"/>
           </a:p>
         </p:txBody>
       </p:sp>
@@ -869,7 +869,7 @@
           <a:bodyPr/>
           <a:lstStyle/>
           <a:p>
-            <a:endParaRPr lang="ru-RU"/>
+            <a:endParaRPr lang="ru-RU" dirty="0"/>
           </a:p>
         </p:txBody>
       </p:sp>
@@ -892,7 +892,7 @@
               <a:rPr lang="ru-RU" smtClean="0"/>
               <a:t>‹#›</a:t>
             </a:fld>
-            <a:endParaRPr lang="ru-RU"/>
+            <a:endParaRPr lang="ru-RU" dirty="0"/>
           </a:p>
         </p:txBody>
       </p:sp>
@@ -1099,9 +1099,9 @@
           <a:p>
             <a:fld id="{D4448603-A256-4D7B-9259-CDBAFBC6E323}" type="datetimeFigureOut">
               <a:rPr lang="ru-RU" smtClean="0"/>
-              <a:t>25.10.2021</a:t>
+              <a:t>01.11.2021</a:t>
             </a:fld>
-            <a:endParaRPr lang="ru-RU"/>
+            <a:endParaRPr lang="ru-RU" dirty="0"/>
           </a:p>
         </p:txBody>
       </p:sp>
@@ -1120,7 +1120,7 @@
           <a:bodyPr/>
           <a:lstStyle/>
           <a:p>
-            <a:endParaRPr lang="ru-RU"/>
+            <a:endParaRPr lang="ru-RU" dirty="0"/>
           </a:p>
         </p:txBody>
       </p:sp>
@@ -1143,7 +1143,7 @@
               <a:rPr lang="ru-RU" smtClean="0"/>
               <a:t>‹#›</a:t>
             </a:fld>
-            <a:endParaRPr lang="ru-RU"/>
+            <a:endParaRPr lang="ru-RU" dirty="0"/>
           </a:p>
         </p:txBody>
       </p:sp>
@@ -1413,9 +1413,9 @@
           <a:p>
             <a:fld id="{D4448603-A256-4D7B-9259-CDBAFBC6E323}" type="datetimeFigureOut">
               <a:rPr lang="ru-RU" smtClean="0"/>
-              <a:t>25.10.2021</a:t>
+              <a:t>01.11.2021</a:t>
             </a:fld>
-            <a:endParaRPr lang="ru-RU"/>
+            <a:endParaRPr lang="ru-RU" dirty="0"/>
           </a:p>
         </p:txBody>
       </p:sp>
@@ -1434,7 +1434,7 @@
           <a:bodyPr/>
           <a:lstStyle/>
           <a:p>
-            <a:endParaRPr lang="ru-RU"/>
+            <a:endParaRPr lang="ru-RU" dirty="0"/>
           </a:p>
         </p:txBody>
       </p:sp>
@@ -1457,7 +1457,7 @@
               <a:rPr lang="ru-RU" smtClean="0"/>
               <a:t>‹#›</a:t>
             </a:fld>
-            <a:endParaRPr lang="ru-RU"/>
+            <a:endParaRPr lang="ru-RU" dirty="0"/>
           </a:p>
         </p:txBody>
       </p:sp>
@@ -1754,9 +1754,9 @@
           <a:p>
             <a:fld id="{D4448603-A256-4D7B-9259-CDBAFBC6E323}" type="datetimeFigureOut">
               <a:rPr lang="ru-RU" smtClean="0"/>
-              <a:t>25.10.2021</a:t>
+              <a:t>01.11.2021</a:t>
             </a:fld>
-            <a:endParaRPr lang="ru-RU"/>
+            <a:endParaRPr lang="ru-RU" dirty="0"/>
           </a:p>
         </p:txBody>
       </p:sp>
@@ -1775,7 +1775,7 @@
           <a:bodyPr/>
           <a:lstStyle/>
           <a:p>
-            <a:endParaRPr lang="ru-RU"/>
+            <a:endParaRPr lang="ru-RU" dirty="0"/>
           </a:p>
         </p:txBody>
       </p:sp>
@@ -1798,7 +1798,7 @@
               <a:rPr lang="ru-RU" smtClean="0"/>
               <a:t>‹#›</a:t>
             </a:fld>
-            <a:endParaRPr lang="ru-RU"/>
+            <a:endParaRPr lang="ru-RU" dirty="0"/>
           </a:p>
         </p:txBody>
       </p:sp>
@@ -2068,9 +2068,9 @@
           <a:p>
             <a:fld id="{D4448603-A256-4D7B-9259-CDBAFBC6E323}" type="datetimeFigureOut">
               <a:rPr lang="ru-RU" smtClean="0"/>
-              <a:t>25.10.2021</a:t>
+              <a:t>01.11.2021</a:t>
             </a:fld>
-            <a:endParaRPr lang="ru-RU"/>
+            <a:endParaRPr lang="ru-RU" dirty="0"/>
           </a:p>
         </p:txBody>
       </p:sp>
@@ -2089,7 +2089,7 @@
           <a:bodyPr/>
           <a:lstStyle/>
           <a:p>
-            <a:endParaRPr lang="ru-RU"/>
+            <a:endParaRPr lang="ru-RU" dirty="0"/>
           </a:p>
         </p:txBody>
       </p:sp>
@@ -2112,7 +2112,7 @@
               <a:rPr lang="ru-RU" smtClean="0"/>
               <a:t>‹#›</a:t>
             </a:fld>
-            <a:endParaRPr lang="ru-RU"/>
+            <a:endParaRPr lang="ru-RU" dirty="0"/>
           </a:p>
         </p:txBody>
       </p:sp>
@@ -2461,9 +2461,9 @@
           <a:p>
             <a:fld id="{D4448603-A256-4D7B-9259-CDBAFBC6E323}" type="datetimeFigureOut">
               <a:rPr lang="ru-RU" smtClean="0"/>
-              <a:t>25.10.2021</a:t>
+              <a:t>01.11.2021</a:t>
             </a:fld>
-            <a:endParaRPr lang="ru-RU"/>
+            <a:endParaRPr lang="ru-RU" dirty="0"/>
           </a:p>
         </p:txBody>
       </p:sp>
@@ -2482,7 +2482,7 @@
           <a:bodyPr/>
           <a:lstStyle/>
           <a:p>
-            <a:endParaRPr lang="ru-RU"/>
+            <a:endParaRPr lang="ru-RU" dirty="0"/>
           </a:p>
         </p:txBody>
       </p:sp>
@@ -2505,7 +2505,7 @@
               <a:rPr lang="ru-RU" smtClean="0"/>
               <a:t>‹#›</a:t>
             </a:fld>
-            <a:endParaRPr lang="ru-RU"/>
+            <a:endParaRPr lang="ru-RU" dirty="0"/>
           </a:p>
         </p:txBody>
       </p:sp>
@@ -2631,9 +2631,9 @@
           <a:p>
             <a:fld id="{D4448603-A256-4D7B-9259-CDBAFBC6E323}" type="datetimeFigureOut">
               <a:rPr lang="ru-RU" smtClean="0"/>
-              <a:t>25.10.2021</a:t>
+              <a:t>01.11.2021</a:t>
             </a:fld>
-            <a:endParaRPr lang="ru-RU"/>
+            <a:endParaRPr lang="ru-RU" dirty="0"/>
           </a:p>
         </p:txBody>
       </p:sp>
@@ -2652,7 +2652,7 @@
           <a:bodyPr/>
           <a:lstStyle/>
           <a:p>
-            <a:endParaRPr lang="ru-RU"/>
+            <a:endParaRPr lang="ru-RU" dirty="0"/>
           </a:p>
         </p:txBody>
       </p:sp>
@@ -2675,7 +2675,7 @@
               <a:rPr lang="ru-RU" smtClean="0"/>
               <a:t>‹#›</a:t>
             </a:fld>
-            <a:endParaRPr lang="ru-RU"/>
+            <a:endParaRPr lang="ru-RU" dirty="0"/>
           </a:p>
         </p:txBody>
       </p:sp>
@@ -2811,9 +2811,9 @@
           <a:p>
             <a:fld id="{D4448603-A256-4D7B-9259-CDBAFBC6E323}" type="datetimeFigureOut">
               <a:rPr lang="ru-RU" smtClean="0"/>
-              <a:t>25.10.2021</a:t>
+              <a:t>01.11.2021</a:t>
             </a:fld>
-            <a:endParaRPr lang="ru-RU"/>
+            <a:endParaRPr lang="ru-RU" dirty="0"/>
           </a:p>
         </p:txBody>
       </p:sp>
@@ -2832,7 +2832,7 @@
           <a:bodyPr/>
           <a:lstStyle/>
           <a:p>
-            <a:endParaRPr lang="ru-RU"/>
+            <a:endParaRPr lang="ru-RU" dirty="0"/>
           </a:p>
         </p:txBody>
       </p:sp>
@@ -2855,7 +2855,7 @@
               <a:rPr lang="ru-RU" smtClean="0"/>
               <a:t>‹#›</a:t>
             </a:fld>
-            <a:endParaRPr lang="ru-RU"/>
+            <a:endParaRPr lang="ru-RU" dirty="0"/>
           </a:p>
         </p:txBody>
       </p:sp>
@@ -2987,9 +2987,9 @@
           <a:p>
             <a:fld id="{D4448603-A256-4D7B-9259-CDBAFBC6E323}" type="datetimeFigureOut">
               <a:rPr lang="ru-RU" smtClean="0"/>
-              <a:t>25.10.2021</a:t>
+              <a:t>01.11.2021</a:t>
             </a:fld>
-            <a:endParaRPr lang="ru-RU"/>
+            <a:endParaRPr lang="ru-RU" dirty="0"/>
           </a:p>
         </p:txBody>
       </p:sp>
@@ -3008,7 +3008,7 @@
           <a:bodyPr/>
           <a:lstStyle/>
           <a:p>
-            <a:endParaRPr lang="ru-RU"/>
+            <a:endParaRPr lang="ru-RU" dirty="0"/>
           </a:p>
         </p:txBody>
       </p:sp>
@@ -3031,7 +3031,7 @@
               <a:rPr lang="ru-RU" smtClean="0"/>
               <a:t>‹#›</a:t>
             </a:fld>
-            <a:endParaRPr lang="ru-RU"/>
+            <a:endParaRPr lang="ru-RU" dirty="0"/>
           </a:p>
         </p:txBody>
       </p:sp>
@@ -3234,9 +3234,9 @@
           <a:p>
             <a:fld id="{D4448603-A256-4D7B-9259-CDBAFBC6E323}" type="datetimeFigureOut">
               <a:rPr lang="ru-RU" smtClean="0"/>
-              <a:t>25.10.2021</a:t>
+              <a:t>01.11.2021</a:t>
             </a:fld>
-            <a:endParaRPr lang="ru-RU"/>
+            <a:endParaRPr lang="ru-RU" dirty="0"/>
           </a:p>
         </p:txBody>
       </p:sp>
@@ -3255,7 +3255,7 @@
           <a:bodyPr/>
           <a:lstStyle/>
           <a:p>
-            <a:endParaRPr lang="ru-RU"/>
+            <a:endParaRPr lang="ru-RU" dirty="0"/>
           </a:p>
         </p:txBody>
       </p:sp>
@@ -3278,7 +3278,7 @@
               <a:rPr lang="ru-RU" smtClean="0"/>
               <a:t>‹#›</a:t>
             </a:fld>
-            <a:endParaRPr lang="ru-RU"/>
+            <a:endParaRPr lang="ru-RU" dirty="0"/>
           </a:p>
         </p:txBody>
       </p:sp>
@@ -3466,9 +3466,9 @@
           <a:p>
             <a:fld id="{D4448603-A256-4D7B-9259-CDBAFBC6E323}" type="datetimeFigureOut">
               <a:rPr lang="ru-RU" smtClean="0"/>
-              <a:t>25.10.2021</a:t>
+              <a:t>01.11.2021</a:t>
             </a:fld>
-            <a:endParaRPr lang="ru-RU"/>
+            <a:endParaRPr lang="ru-RU" dirty="0"/>
           </a:p>
         </p:txBody>
       </p:sp>
@@ -3487,7 +3487,7 @@
           <a:bodyPr/>
           <a:lstStyle/>
           <a:p>
-            <a:endParaRPr lang="ru-RU"/>
+            <a:endParaRPr lang="ru-RU" dirty="0"/>
           </a:p>
         </p:txBody>
       </p:sp>
@@ -3510,7 +3510,7 @@
               <a:rPr lang="ru-RU" smtClean="0"/>
               <a:t>‹#›</a:t>
             </a:fld>
-            <a:endParaRPr lang="ru-RU"/>
+            <a:endParaRPr lang="ru-RU" dirty="0"/>
           </a:p>
         </p:txBody>
       </p:sp>
@@ -3840,9 +3840,9 @@
           <a:p>
             <a:fld id="{D4448603-A256-4D7B-9259-CDBAFBC6E323}" type="datetimeFigureOut">
               <a:rPr lang="ru-RU" smtClean="0"/>
-              <a:t>25.10.2021</a:t>
+              <a:t>01.11.2021</a:t>
             </a:fld>
-            <a:endParaRPr lang="ru-RU"/>
+            <a:endParaRPr lang="ru-RU" dirty="0"/>
           </a:p>
         </p:txBody>
       </p:sp>
@@ -3861,7 +3861,7 @@
           <a:bodyPr/>
           <a:lstStyle/>
           <a:p>
-            <a:endParaRPr lang="ru-RU"/>
+            <a:endParaRPr lang="ru-RU" dirty="0"/>
           </a:p>
         </p:txBody>
       </p:sp>
@@ -3884,7 +3884,7 @@
               <a:rPr lang="ru-RU" smtClean="0"/>
               <a:t>‹#›</a:t>
             </a:fld>
-            <a:endParaRPr lang="ru-RU"/>
+            <a:endParaRPr lang="ru-RU" dirty="0"/>
           </a:p>
         </p:txBody>
       </p:sp>
@@ -3963,9 +3963,9 @@
           <a:p>
             <a:fld id="{D4448603-A256-4D7B-9259-CDBAFBC6E323}" type="datetimeFigureOut">
               <a:rPr lang="ru-RU" smtClean="0"/>
-              <a:t>25.10.2021</a:t>
+              <a:t>01.11.2021</a:t>
             </a:fld>
-            <a:endParaRPr lang="ru-RU"/>
+            <a:endParaRPr lang="ru-RU" dirty="0"/>
           </a:p>
         </p:txBody>
       </p:sp>
@@ -3984,7 +3984,7 @@
           <a:bodyPr/>
           <a:lstStyle/>
           <a:p>
-            <a:endParaRPr lang="ru-RU"/>
+            <a:endParaRPr lang="ru-RU" dirty="0"/>
           </a:p>
         </p:txBody>
       </p:sp>
@@ -4007,7 +4007,7 @@
               <a:rPr lang="ru-RU" smtClean="0"/>
               <a:t>‹#›</a:t>
             </a:fld>
-            <a:endParaRPr lang="ru-RU"/>
+            <a:endParaRPr lang="ru-RU" dirty="0"/>
           </a:p>
         </p:txBody>
       </p:sp>
@@ -4058,9 +4058,9 @@
           <a:p>
             <a:fld id="{D4448603-A256-4D7B-9259-CDBAFBC6E323}" type="datetimeFigureOut">
               <a:rPr lang="ru-RU" smtClean="0"/>
-              <a:t>25.10.2021</a:t>
+              <a:t>01.11.2021</a:t>
             </a:fld>
-            <a:endParaRPr lang="ru-RU"/>
+            <a:endParaRPr lang="ru-RU" dirty="0"/>
           </a:p>
         </p:txBody>
       </p:sp>
@@ -4079,7 +4079,7 @@
           <a:bodyPr/>
           <a:lstStyle/>
           <a:p>
-            <a:endParaRPr lang="ru-RU"/>
+            <a:endParaRPr lang="ru-RU" dirty="0"/>
           </a:p>
         </p:txBody>
       </p:sp>
@@ -4102,7 +4102,7 @@
               <a:rPr lang="ru-RU" smtClean="0"/>
               <a:t>‹#›</a:t>
             </a:fld>
-            <a:endParaRPr lang="ru-RU"/>
+            <a:endParaRPr lang="ru-RU" dirty="0"/>
           </a:p>
         </p:txBody>
       </p:sp>
@@ -4313,9 +4313,9 @@
           <a:p>
             <a:fld id="{D4448603-A256-4D7B-9259-CDBAFBC6E323}" type="datetimeFigureOut">
               <a:rPr lang="ru-RU" smtClean="0"/>
-              <a:t>25.10.2021</a:t>
+              <a:t>01.11.2021</a:t>
             </a:fld>
-            <a:endParaRPr lang="ru-RU"/>
+            <a:endParaRPr lang="ru-RU" dirty="0"/>
           </a:p>
         </p:txBody>
       </p:sp>
@@ -4334,7 +4334,7 @@
           <a:bodyPr/>
           <a:lstStyle/>
           <a:p>
-            <a:endParaRPr lang="ru-RU"/>
+            <a:endParaRPr lang="ru-RU" dirty="0"/>
           </a:p>
         </p:txBody>
       </p:sp>
@@ -4357,7 +4357,7 @@
               <a:rPr lang="ru-RU" smtClean="0"/>
               <a:t>‹#›</a:t>
             </a:fld>
-            <a:endParaRPr lang="ru-RU"/>
+            <a:endParaRPr lang="ru-RU" dirty="0"/>
           </a:p>
         </p:txBody>
       </p:sp>
@@ -4485,7 +4485,7 @@
           </a:lstStyle>
           <a:p>
             <a:r>
-              <a:rPr lang="ru-RU" smtClean="0"/>
+              <a:rPr lang="ru-RU" dirty="0" smtClean="0"/>
               <a:t>Вставка рисунка</a:t>
             </a:r>
             <a:endParaRPr lang="en-US" dirty="0"/>
@@ -4576,9 +4576,9 @@
           <a:p>
             <a:fld id="{D4448603-A256-4D7B-9259-CDBAFBC6E323}" type="datetimeFigureOut">
               <a:rPr lang="ru-RU" smtClean="0"/>
-              <a:t>25.10.2021</a:t>
+              <a:t>01.11.2021</a:t>
             </a:fld>
-            <a:endParaRPr lang="ru-RU"/>
+            <a:endParaRPr lang="ru-RU" dirty="0"/>
           </a:p>
         </p:txBody>
       </p:sp>
@@ -4597,7 +4597,7 @@
           <a:bodyPr/>
           <a:lstStyle/>
           <a:p>
-            <a:endParaRPr lang="ru-RU"/>
+            <a:endParaRPr lang="ru-RU" dirty="0"/>
           </a:p>
         </p:txBody>
       </p:sp>
@@ -4620,7 +4620,7 @@
               <a:rPr lang="ru-RU" smtClean="0"/>
               <a:t>‹#›</a:t>
             </a:fld>
-            <a:endParaRPr lang="ru-RU"/>
+            <a:endParaRPr lang="ru-RU" dirty="0"/>
           </a:p>
         </p:txBody>
       </p:sp>
@@ -5319,9 +5319,9 @@
           <a:p>
             <a:fld id="{D4448603-A256-4D7B-9259-CDBAFBC6E323}" type="datetimeFigureOut">
               <a:rPr lang="ru-RU" smtClean="0"/>
-              <a:t>25.10.2021</a:t>
+              <a:t>01.11.2021</a:t>
             </a:fld>
-            <a:endParaRPr lang="ru-RU"/>
+            <a:endParaRPr lang="ru-RU" dirty="0"/>
           </a:p>
         </p:txBody>
       </p:sp>
@@ -5358,7 +5358,7 @@
             </a:lvl1pPr>
           </a:lstStyle>
           <a:p>
-            <a:endParaRPr lang="ru-RU"/>
+            <a:endParaRPr lang="ru-RU" dirty="0"/>
           </a:p>
         </p:txBody>
       </p:sp>
@@ -5397,7 +5397,7 @@
               <a:rPr lang="ru-RU" smtClean="0"/>
               <a:t>‹#›</a:t>
             </a:fld>
-            <a:endParaRPr lang="ru-RU"/>
+            <a:endParaRPr lang="ru-RU" dirty="0"/>
           </a:p>
         </p:txBody>
       </p:sp>
@@ -5865,32 +5865,11 @@
           <a:p>
             <a:pPr algn="l"/>
             <a:r>
-              <a:rPr lang="ru-RU" sz="4800" b="1" dirty="0" err="1" smtClean="0">
-                <a:latin typeface="Calibri" panose="020F0502020204030204" pitchFamily="34" charset="0"/>
-                <a:cs typeface="Calibri" panose="020F0502020204030204" pitchFamily="34" charset="0"/>
-              </a:rPr>
-              <a:t>Скрейпинг</a:t>
-            </a:r>
-            <a:r>
               <a:rPr lang="ru-RU" sz="4800" b="1" dirty="0" smtClean="0">
                 <a:latin typeface="Calibri" panose="020F0502020204030204" pitchFamily="34" charset="0"/>
                 <a:cs typeface="Calibri" panose="020F0502020204030204" pitchFamily="34" charset="0"/>
               </a:rPr>
-              <a:t>/</a:t>
-            </a:r>
-            <a:r>
-              <a:rPr lang="ru-RU" sz="4800" b="1" dirty="0" err="1" smtClean="0">
-                <a:latin typeface="Calibri" panose="020F0502020204030204" pitchFamily="34" charset="0"/>
-                <a:cs typeface="Calibri" panose="020F0502020204030204" pitchFamily="34" charset="0"/>
-              </a:rPr>
-              <a:t>Парсинг</a:t>
-            </a:r>
-            <a:r>
-              <a:rPr lang="ru-RU" sz="4800" b="1" dirty="0" smtClean="0">
-                <a:latin typeface="Calibri" panose="020F0502020204030204" pitchFamily="34" charset="0"/>
-                <a:cs typeface="Calibri" panose="020F0502020204030204" pitchFamily="34" charset="0"/>
-              </a:rPr>
-              <a:t> сайта</a:t>
+              <a:t>Скрейпинг/Парсинг сайта</a:t>
             </a:r>
             <a:br>
               <a:rPr lang="ru-RU" sz="4800" b="1" dirty="0" smtClean="0">
@@ -5964,14 +5943,7 @@
                 <a:latin typeface="Calibri" panose="020F0502020204030204" pitchFamily="34" charset="0"/>
                 <a:cs typeface="Calibri" panose="020F0502020204030204" pitchFamily="34" charset="0"/>
               </a:rPr>
-              <a:t>инженер, аспирант и преподаватель </a:t>
-            </a:r>
-            <a:r>
-              <a:rPr lang="ru-RU" dirty="0" err="1">
-                <a:latin typeface="Calibri" panose="020F0502020204030204" pitchFamily="34" charset="0"/>
-                <a:cs typeface="Calibri" panose="020F0502020204030204" pitchFamily="34" charset="0"/>
-              </a:rPr>
-              <a:t>СПбПУ</a:t>
+              <a:t>инженер, аспирант и преподаватель СПбПУ</a:t>
             </a:r>
             <a:r>
               <a:rPr lang="ru-RU" dirty="0" smtClean="0">
@@ -5983,18 +5955,11 @@
           </a:p>
           <a:p>
             <a:r>
-              <a:rPr lang="ru-RU" dirty="0" err="1" smtClean="0">
-                <a:latin typeface="Calibri" panose="020F0502020204030204" pitchFamily="34" charset="0"/>
-                <a:cs typeface="Calibri" panose="020F0502020204030204" pitchFamily="34" charset="0"/>
-              </a:rPr>
-              <a:t>Калюжнюк</a:t>
-            </a:r>
-            <a:r>
               <a:rPr lang="ru-RU" dirty="0" smtClean="0">
                 <a:latin typeface="Calibri" panose="020F0502020204030204" pitchFamily="34" charset="0"/>
                 <a:cs typeface="Calibri" panose="020F0502020204030204" pitchFamily="34" charset="0"/>
               </a:rPr>
-              <a:t> Александр Всеволодович </a:t>
+              <a:t>Калюжнюк Александр Всеволодович </a:t>
             </a:r>
           </a:p>
           <a:p>
@@ -6255,7 +6220,7 @@
               <a:t> </a:t>
             </a:r>
             <a:r>
-              <a:rPr lang="en-US" sz="2000" b="1" dirty="0" err="1" smtClean="0">
+              <a:rPr lang="en-US" sz="2000" b="1" dirty="0" smtClean="0">
                 <a:latin typeface="Calibri" panose="020F0502020204030204" pitchFamily="34" charset="0"/>
                 <a:cs typeface="Calibri" panose="020F0502020204030204" pitchFamily="34" charset="0"/>
               </a:rPr>
@@ -6290,18 +6255,11 @@
               <a:t> </a:t>
             </a:r>
             <a:r>
-              <a:rPr lang="ru-RU" sz="2000" dirty="0" err="1" smtClean="0">
-                <a:latin typeface="Calibri" panose="020F0502020204030204" pitchFamily="34" charset="0"/>
-                <a:cs typeface="Calibri" panose="020F0502020204030204" pitchFamily="34" charset="0"/>
-              </a:rPr>
-              <a:t>парсит</a:t>
-            </a:r>
-            <a:r>
               <a:rPr lang="ru-RU" sz="2000" dirty="0" smtClean="0">
                 <a:latin typeface="Calibri" panose="020F0502020204030204" pitchFamily="34" charset="0"/>
                 <a:cs typeface="Calibri" panose="020F0502020204030204" pitchFamily="34" charset="0"/>
               </a:rPr>
-              <a:t> </a:t>
+              <a:t>парсит </a:t>
             </a:r>
             <a:r>
               <a:rPr lang="en-US" sz="2000" dirty="0" smtClean="0">
@@ -6512,7 +6470,7 @@
               <a:t> </a:t>
             </a:r>
             <a:r>
-              <a:rPr lang="en-US" b="1" dirty="0" err="1" smtClean="0">
+              <a:rPr lang="en-US" b="1" dirty="0" smtClean="0">
                 <a:latin typeface="Calibri" panose="020F0502020204030204" pitchFamily="34" charset="0"/>
                 <a:cs typeface="Calibri" panose="020F0502020204030204" pitchFamily="34" charset="0"/>
               </a:rPr>
@@ -6634,7 +6592,7 @@
               <a:t>С помощью модуля </a:t>
             </a:r>
             <a:r>
-              <a:rPr lang="en-US" b="1" dirty="0" err="1" smtClean="0">
+              <a:rPr lang="en-US" b="1" dirty="0" smtClean="0">
                 <a:latin typeface="Calibri" panose="020F0502020204030204" pitchFamily="34" charset="0"/>
                 <a:cs typeface="Calibri" panose="020F0502020204030204" pitchFamily="34" charset="0"/>
               </a:rPr>
@@ -6655,7 +6613,7 @@
               <a:t>определяем файл для записи и разделители полей, далее используя </a:t>
             </a:r>
             <a:r>
-              <a:rPr lang="en-US" b="1" dirty="0" err="1" smtClean="0">
+              <a:rPr lang="en-US" b="1" dirty="0" smtClean="0">
                 <a:latin typeface="Calibri" panose="020F0502020204030204" pitchFamily="34" charset="0"/>
                 <a:cs typeface="Calibri" panose="020F0502020204030204" pitchFamily="34" charset="0"/>
               </a:rPr>
@@ -6748,91 +6706,84 @@
                 <a:latin typeface="Calibri" panose="020F0502020204030204" pitchFamily="34" charset="0"/>
                 <a:cs typeface="Calibri" panose="020F0502020204030204" pitchFamily="34" charset="0"/>
               </a:rPr>
-              <a:t>при </a:t>
-            </a:r>
-            <a:r>
-              <a:rPr lang="ru-RU" sz="1400" dirty="0" err="1" smtClean="0">
-                <a:latin typeface="Calibri" panose="020F0502020204030204" pitchFamily="34" charset="0"/>
-                <a:cs typeface="Calibri" panose="020F0502020204030204" pitchFamily="34" charset="0"/>
-              </a:rPr>
-              <a:t>скрейпинге</a:t>
+              <a:t>при скрейпинге </a:t>
+            </a:r>
+            <a:r>
+              <a:rPr lang="en-US" sz="1400" dirty="0" smtClean="0">
+                <a:latin typeface="Calibri" panose="020F0502020204030204" pitchFamily="34" charset="0"/>
+                <a:cs typeface="Calibri" panose="020F0502020204030204" pitchFamily="34" charset="0"/>
+              </a:rPr>
+              <a:t>HTML-</a:t>
             </a:r>
             <a:r>
               <a:rPr lang="ru-RU" sz="1400" dirty="0" smtClean="0">
                 <a:latin typeface="Calibri" panose="020F0502020204030204" pitchFamily="34" charset="0"/>
                 <a:cs typeface="Calibri" panose="020F0502020204030204" pitchFamily="34" charset="0"/>
               </a:rPr>
+              <a:t>страницы </a:t>
+            </a:r>
+            <a:r>
+              <a:rPr lang="en-US" sz="1400" dirty="0" smtClean="0">
+                <a:latin typeface="Calibri" panose="020F0502020204030204" pitchFamily="34" charset="0"/>
+                <a:cs typeface="Calibri" panose="020F0502020204030204" pitchFamily="34" charset="0"/>
+              </a:rPr>
+              <a:t>‘utf-8’, </a:t>
+            </a:r>
+            <a:r>
+              <a:rPr lang="ru-RU" sz="1400" dirty="0" smtClean="0">
+                <a:latin typeface="Calibri" panose="020F0502020204030204" pitchFamily="34" charset="0"/>
+                <a:cs typeface="Calibri" panose="020F0502020204030204" pitchFamily="34" charset="0"/>
+              </a:rPr>
+              <a:t>при записи в файл она меняется на </a:t>
+            </a:r>
+            <a:r>
+              <a:rPr lang="en-US" sz="1400" dirty="0" smtClean="0">
+                <a:latin typeface="Calibri" panose="020F0502020204030204" pitchFamily="34" charset="0"/>
+                <a:cs typeface="Calibri" panose="020F0502020204030204" pitchFamily="34" charset="0"/>
+              </a:rPr>
+              <a:t>‘cp1251’, </a:t>
+            </a:r>
+            <a:r>
+              <a:rPr lang="ru-RU" sz="1400" dirty="0" smtClean="0">
+                <a:latin typeface="Calibri" panose="020F0502020204030204" pitchFamily="34" charset="0"/>
+                <a:cs typeface="Calibri" panose="020F0502020204030204" pitchFamily="34" charset="0"/>
+              </a:rPr>
+              <a:t>при кодировании</a:t>
+            </a:r>
+            <a:r>
+              <a:rPr lang="en-US" sz="1400" dirty="0" smtClean="0">
+                <a:latin typeface="Calibri" panose="020F0502020204030204" pitchFamily="34" charset="0"/>
+                <a:cs typeface="Calibri" panose="020F0502020204030204" pitchFamily="34" charset="0"/>
+              </a:rPr>
               <a:t> </a:t>
             </a:r>
             <a:r>
+              <a:rPr lang="ru-RU" sz="1400" dirty="0" smtClean="0">
+                <a:latin typeface="Calibri" panose="020F0502020204030204" pitchFamily="34" charset="0"/>
+                <a:cs typeface="Calibri" panose="020F0502020204030204" pitchFamily="34" charset="0"/>
+              </a:rPr>
+              <a:t>и записи в файл </a:t>
+            </a:r>
+            <a:r>
               <a:rPr lang="en-US" sz="1400" dirty="0" smtClean="0">
                 <a:latin typeface="Calibri" panose="020F0502020204030204" pitchFamily="34" charset="0"/>
                 <a:cs typeface="Calibri" panose="020F0502020204030204" pitchFamily="34" charset="0"/>
               </a:rPr>
-              <a:t>HTML-</a:t>
+              <a:t>csv</a:t>
             </a:r>
             <a:r>
               <a:rPr lang="ru-RU" sz="1400" dirty="0" smtClean="0">
                 <a:latin typeface="Calibri" panose="020F0502020204030204" pitchFamily="34" charset="0"/>
                 <a:cs typeface="Calibri" panose="020F0502020204030204" pitchFamily="34" charset="0"/>
               </a:rPr>
-              <a:t>страницы </a:t>
-            </a:r>
-            <a:r>
-              <a:rPr lang="en-US" sz="1400" dirty="0" smtClean="0">
-                <a:latin typeface="Calibri" panose="020F0502020204030204" pitchFamily="34" charset="0"/>
-                <a:cs typeface="Calibri" panose="020F0502020204030204" pitchFamily="34" charset="0"/>
-              </a:rPr>
-              <a:t>‘utf-8’, </a:t>
+              <a:t> могут возникнуть ошибки из-за отсутствия данных о первоначальной кодировке </a:t>
             </a:r>
             <a:r>
               <a:rPr lang="ru-RU" sz="1400" dirty="0" smtClean="0">
                 <a:latin typeface="Calibri" panose="020F0502020204030204" pitchFamily="34" charset="0"/>
                 <a:cs typeface="Calibri" panose="020F0502020204030204" pitchFamily="34" charset="0"/>
               </a:rPr>
-              <a:t>при записи в файл она меняется на </a:t>
-            </a:r>
-            <a:r>
-              <a:rPr lang="en-US" sz="1400" dirty="0" smtClean="0">
-                <a:latin typeface="Calibri" panose="020F0502020204030204" pitchFamily="34" charset="0"/>
-                <a:cs typeface="Calibri" panose="020F0502020204030204" pitchFamily="34" charset="0"/>
-              </a:rPr>
-              <a:t>‘cp1251’, </a:t>
-            </a:r>
-            <a:r>
-              <a:rPr lang="ru-RU" sz="1400" dirty="0" smtClean="0">
-                <a:latin typeface="Calibri" panose="020F0502020204030204" pitchFamily="34" charset="0"/>
-                <a:cs typeface="Calibri" panose="020F0502020204030204" pitchFamily="34" charset="0"/>
-              </a:rPr>
-              <a:t>при кодировании</a:t>
-            </a:r>
-            <a:r>
-              <a:rPr lang="en-US" sz="1400" dirty="0" smtClean="0">
-                <a:latin typeface="Calibri" panose="020F0502020204030204" pitchFamily="34" charset="0"/>
-                <a:cs typeface="Calibri" panose="020F0502020204030204" pitchFamily="34" charset="0"/>
-              </a:rPr>
-              <a:t> </a:t>
-            </a:r>
-            <a:r>
-              <a:rPr lang="ru-RU" sz="1400" dirty="0" smtClean="0">
-                <a:latin typeface="Calibri" panose="020F0502020204030204" pitchFamily="34" charset="0"/>
-                <a:cs typeface="Calibri" panose="020F0502020204030204" pitchFamily="34" charset="0"/>
-              </a:rPr>
-              <a:t>и записи в файл </a:t>
-            </a:r>
-            <a:r>
-              <a:rPr lang="en-US" sz="1400" dirty="0" smtClean="0">
-                <a:latin typeface="Calibri" panose="020F0502020204030204" pitchFamily="34" charset="0"/>
-                <a:cs typeface="Calibri" panose="020F0502020204030204" pitchFamily="34" charset="0"/>
-              </a:rPr>
-              <a:t>csv</a:t>
-            </a:r>
-            <a:r>
-              <a:rPr lang="ru-RU" sz="1400" dirty="0" smtClean="0">
-                <a:latin typeface="Calibri" panose="020F0502020204030204" pitchFamily="34" charset="0"/>
-                <a:cs typeface="Calibri" panose="020F0502020204030204" pitchFamily="34" charset="0"/>
-              </a:rPr>
-              <a:t> могут возникнуть ошибки из-за отсутствия данных о первоначальной кодировке </a:t>
+              <a:t>текста </a:t>
             </a:r>
             <a:r>
               <a:rPr lang="en-US" sz="1400" dirty="0" smtClean="0">
@@ -7008,18 +6959,11 @@
               <a:buChar char="q"/>
             </a:pPr>
             <a:r>
-              <a:rPr lang="ru-RU" sz="1600" dirty="0" err="1" smtClean="0">
-                <a:latin typeface="Calibri" panose="020F0502020204030204" pitchFamily="34" charset="0"/>
-                <a:cs typeface="Calibri" panose="020F0502020204030204" pitchFamily="34" charset="0"/>
-              </a:rPr>
-              <a:t>Скрейпинг</a:t>
-            </a:r>
-            <a:r>
               <a:rPr lang="ru-RU" sz="1600" dirty="0" smtClean="0">
                 <a:latin typeface="Calibri" panose="020F0502020204030204" pitchFamily="34" charset="0"/>
                 <a:cs typeface="Calibri" panose="020F0502020204030204" pitchFamily="34" charset="0"/>
               </a:rPr>
-              <a:t> страницы по заданному </a:t>
+              <a:t>Скрейпинг страницы по заданному </a:t>
             </a:r>
             <a:r>
               <a:rPr lang="en-US" sz="1600" dirty="0" smtClean="0">
@@ -7110,53 +7054,18 @@
               <a:t>Создаём пустой список и с помощью </a:t>
             </a:r>
             <a:r>
-              <a:rPr lang="en-US" sz="1600" dirty="0" err="1" smtClean="0">
-                <a:latin typeface="Calibri" panose="020F0502020204030204" pitchFamily="34" charset="0"/>
-                <a:cs typeface="Calibri" panose="020F0502020204030204" pitchFamily="34" charset="0"/>
-              </a:rPr>
-              <a:t>tqdm</a:t>
-            </a:r>
-            <a:r>
               <a:rPr lang="en-US" sz="1600" dirty="0" smtClean="0">
                 <a:latin typeface="Calibri" panose="020F0502020204030204" pitchFamily="34" charset="0"/>
                 <a:cs typeface="Calibri" panose="020F0502020204030204" pitchFamily="34" charset="0"/>
               </a:rPr>
-              <a:t> </a:t>
+              <a:t>tqdm </a:t>
             </a:r>
             <a:r>
               <a:rPr lang="ru-RU" sz="1600" dirty="0" smtClean="0">
                 <a:latin typeface="Calibri" panose="020F0502020204030204" pitchFamily="34" charset="0"/>
                 <a:cs typeface="Calibri" panose="020F0502020204030204" pitchFamily="34" charset="0"/>
               </a:rPr>
-              <a:t>отображаем прогресс </a:t>
-            </a:r>
-            <a:r>
-              <a:rPr lang="ru-RU" sz="1600" dirty="0" err="1" smtClean="0">
-                <a:latin typeface="Calibri" panose="020F0502020204030204" pitchFamily="34" charset="0"/>
-                <a:cs typeface="Calibri" panose="020F0502020204030204" pitchFamily="34" charset="0"/>
-              </a:rPr>
-              <a:t>парсинга</a:t>
-            </a:r>
-            <a:r>
-              <a:rPr lang="ru-RU" sz="1600" dirty="0" smtClean="0">
-                <a:latin typeface="Calibri" panose="020F0502020204030204" pitchFamily="34" charset="0"/>
-                <a:cs typeface="Calibri" panose="020F0502020204030204" pitchFamily="34" charset="0"/>
-              </a:rPr>
-              <a:t> страниц каталога с добавлением полученной информации в него, перерыв между итерациями 1 или 2 секунды во избежание </a:t>
-            </a:r>
-            <a:r>
-              <a:rPr lang="ru-RU" sz="1600" dirty="0" err="1" smtClean="0">
-                <a:latin typeface="Calibri" panose="020F0502020204030204" pitchFamily="34" charset="0"/>
-                <a:cs typeface="Calibri" panose="020F0502020204030204" pitchFamily="34" charset="0"/>
-              </a:rPr>
-              <a:t>бана</a:t>
-            </a:r>
-            <a:r>
-              <a:rPr lang="ru-RU" sz="1600" dirty="0" smtClean="0">
-                <a:latin typeface="Calibri" panose="020F0502020204030204" pitchFamily="34" charset="0"/>
-                <a:cs typeface="Calibri" panose="020F0502020204030204" pitchFamily="34" charset="0"/>
-              </a:rPr>
-              <a:t> со стороны сервера сайта;</a:t>
+              <a:t>отображаем прогресс парсинга страниц каталога с добавлением полученной информации в него, перерыв между итерациями 1 или 2 секунды во избежание бана со стороны сервера сайта;</a:t>
             </a:r>
           </a:p>
           <a:p>
@@ -7511,18 +7420,11 @@
                 <a:latin typeface="Calibri" panose="020F0502020204030204" pitchFamily="34" charset="0"/>
                 <a:cs typeface="Calibri" panose="020F0502020204030204" pitchFamily="34" charset="0"/>
               </a:rPr>
-              <a:t>При </a:t>
-            </a:r>
-            <a:r>
-              <a:rPr lang="ru-RU" dirty="0" err="1" smtClean="0">
-                <a:solidFill>
-                  <a:schemeClr val="dk1"/>
-                </a:solidFill>
-                <a:latin typeface="Calibri" panose="020F0502020204030204" pitchFamily="34" charset="0"/>
-                <a:cs typeface="Calibri" panose="020F0502020204030204" pitchFamily="34" charset="0"/>
-              </a:rPr>
-              <a:t>скрейпинге</a:t>
-            </a:r>
+              <a:t>При скрейпинге/парсинге сайта для начала необходимо изучить структуру страниц, что говорит об индивидуальном подходе к каждому сайту – один и тот же парсер не будет работать на разных сайтах.</a:t>
+            </a:r>
+          </a:p>
+          <a:p>
+            <a:pPr algn="just"/>
             <a:r>
               <a:rPr lang="ru-RU" dirty="0" smtClean="0">
                 <a:solidFill>
@@ -7531,112 +7433,45 @@
                 <a:latin typeface="Calibri" panose="020F0502020204030204" pitchFamily="34" charset="0"/>
                 <a:cs typeface="Calibri" panose="020F0502020204030204" pitchFamily="34" charset="0"/>
               </a:rPr>
-              <a:t>/</a:t>
-            </a:r>
-            <a:r>
-              <a:rPr lang="ru-RU" dirty="0" err="1" smtClean="0">
-                <a:solidFill>
-                  <a:schemeClr val="dk1"/>
-                </a:solidFill>
-                <a:latin typeface="Calibri" panose="020F0502020204030204" pitchFamily="34" charset="0"/>
-                <a:cs typeface="Calibri" panose="020F0502020204030204" pitchFamily="34" charset="0"/>
-              </a:rPr>
-              <a:t>парсинге</a:t>
-            </a:r>
+              <a:t>Так же желательно знать кодировку, используемую на сайте, во избежание ошибок кодирования-декодирования.</a:t>
+            </a:r>
+          </a:p>
+          <a:p>
+            <a:pPr algn="just"/>
             <a:r>
               <a:rPr lang="ru-RU" dirty="0" smtClean="0">
-                <a:solidFill>
-                  <a:schemeClr val="dk1"/>
-                </a:solidFill>
-                <a:latin typeface="Calibri" panose="020F0502020204030204" pitchFamily="34" charset="0"/>
-                <a:cs typeface="Calibri" panose="020F0502020204030204" pitchFamily="34" charset="0"/>
-              </a:rPr>
-              <a:t> сайта для начала необходимо изучить структуру страниц, что говорит об индивидуальном подходе к каждому сайту – один и тот же </a:t>
-            </a:r>
-            <a:r>
-              <a:rPr lang="ru-RU" dirty="0" err="1" smtClean="0">
-                <a:solidFill>
-                  <a:schemeClr val="dk1"/>
-                </a:solidFill>
-                <a:latin typeface="Calibri" panose="020F0502020204030204" pitchFamily="34" charset="0"/>
-                <a:cs typeface="Calibri" panose="020F0502020204030204" pitchFamily="34" charset="0"/>
-              </a:rPr>
-              <a:t>парсер</a:t>
+                <a:latin typeface="Calibri" panose="020F0502020204030204" pitchFamily="34" charset="0"/>
+                <a:cs typeface="Calibri" panose="020F0502020204030204" pitchFamily="34" charset="0"/>
+              </a:rPr>
+              <a:t>Программа </a:t>
+            </a:r>
+            <a:r>
+              <a:rPr lang="ru-RU" dirty="0">
+                <a:latin typeface="Calibri" panose="020F0502020204030204" pitchFamily="34" charset="0"/>
+                <a:cs typeface="Calibri" panose="020F0502020204030204" pitchFamily="34" charset="0"/>
+              </a:rPr>
+              <a:t>хорошо и довольно быстро обрабатывает до </a:t>
+            </a:r>
+            <a:r>
+              <a:rPr lang="en-US" dirty="0">
+                <a:latin typeface="Calibri" panose="020F0502020204030204" pitchFamily="34" charset="0"/>
+                <a:cs typeface="Calibri" panose="020F0502020204030204" pitchFamily="34" charset="0"/>
+              </a:rPr>
+              <a:t>~20</a:t>
+            </a:r>
+            <a:r>
+              <a:rPr lang="ru-RU" dirty="0">
+                <a:latin typeface="Calibri" panose="020F0502020204030204" pitchFamily="34" charset="0"/>
+                <a:cs typeface="Calibri" panose="020F0502020204030204" pitchFamily="34" charset="0"/>
+              </a:rPr>
+              <a:t> страниц – время обработки составляет порядка </a:t>
             </a:r>
             <a:r>
               <a:rPr lang="ru-RU" dirty="0" smtClean="0">
-                <a:solidFill>
-                  <a:schemeClr val="dk1"/>
-                </a:solidFill>
-                <a:latin typeface="Calibri" panose="020F0502020204030204" pitchFamily="34" charset="0"/>
-                <a:cs typeface="Calibri" panose="020F0502020204030204" pitchFamily="34" charset="0"/>
-              </a:rPr>
-              <a:t> не будет работать на разных сайтах.</a:t>
-            </a:r>
-          </a:p>
-          <a:p>
-            <a:pPr algn="just"/>
-            <a:r>
-              <a:rPr lang="ru-RU" dirty="0" smtClean="0">
-                <a:solidFill>
-                  <a:schemeClr val="dk1"/>
-                </a:solidFill>
-                <a:latin typeface="Calibri" panose="020F0502020204030204" pitchFamily="34" charset="0"/>
-                <a:cs typeface="Calibri" panose="020F0502020204030204" pitchFamily="34" charset="0"/>
-              </a:rPr>
-              <a:t>Так же желательно знать кодировку, используемую на сайте, во избежание ошибок кодирования-декодирования.</a:t>
-            </a:r>
-          </a:p>
-          <a:p>
-            <a:pPr algn="just"/>
-            <a:r>
-              <a:rPr lang="ru-RU" dirty="0" smtClean="0">
-                <a:latin typeface="Calibri" panose="020F0502020204030204" pitchFamily="34" charset="0"/>
-                <a:cs typeface="Calibri" panose="020F0502020204030204" pitchFamily="34" charset="0"/>
-              </a:rPr>
-              <a:t>Программа </a:t>
-            </a:r>
-            <a:r>
-              <a:rPr lang="ru-RU" dirty="0">
-                <a:latin typeface="Calibri" panose="020F0502020204030204" pitchFamily="34" charset="0"/>
-                <a:cs typeface="Calibri" panose="020F0502020204030204" pitchFamily="34" charset="0"/>
-              </a:rPr>
-              <a:t>хорошо и довольно быстро обрабатывает до </a:t>
-            </a:r>
-            <a:r>
-              <a:rPr lang="en-US" dirty="0">
-                <a:latin typeface="Calibri" panose="020F0502020204030204" pitchFamily="34" charset="0"/>
-                <a:cs typeface="Calibri" panose="020F0502020204030204" pitchFamily="34" charset="0"/>
-              </a:rPr>
-              <a:t>~20</a:t>
-            </a:r>
-            <a:r>
-              <a:rPr lang="ru-RU" dirty="0">
-                <a:latin typeface="Calibri" panose="020F0502020204030204" pitchFamily="34" charset="0"/>
-                <a:cs typeface="Calibri" panose="020F0502020204030204" pitchFamily="34" charset="0"/>
-              </a:rPr>
-              <a:t> страниц – время обработки составляет порядка </a:t>
-            </a:r>
-            <a:r>
-              <a:rPr lang="ru-RU" dirty="0" smtClean="0">
-                <a:latin typeface="Calibri" panose="020F0502020204030204" pitchFamily="34" charset="0"/>
-                <a:cs typeface="Calibri" panose="020F0502020204030204" pitchFamily="34" charset="0"/>
-              </a:rPr>
-              <a:t>10 секунд (без включенного </a:t>
-            </a:r>
-            <a:r>
-              <a:rPr lang="ru-RU" dirty="0" err="1" smtClean="0">
-                <a:latin typeface="Calibri" panose="020F0502020204030204" pitchFamily="34" charset="0"/>
-                <a:cs typeface="Calibri" panose="020F0502020204030204" pitchFamily="34" charset="0"/>
-              </a:rPr>
-              <a:t>тайминга</a:t>
-            </a:r>
-            <a:r>
-              <a:rPr lang="ru-RU" dirty="0" smtClean="0">
-                <a:latin typeface="Calibri" panose="020F0502020204030204" pitchFamily="34" charset="0"/>
-                <a:cs typeface="Calibri" panose="020F0502020204030204" pitchFamily="34" charset="0"/>
-              </a:rPr>
-              <a:t>). </a:t>
+                <a:latin typeface="Calibri" panose="020F0502020204030204" pitchFamily="34" charset="0"/>
+                <a:cs typeface="Calibri" panose="020F0502020204030204" pitchFamily="34" charset="0"/>
+              </a:rPr>
+              <a:t>10 секунд (без включенного тайминга). </a:t>
             </a:r>
             <a:r>
               <a:rPr lang="ru-RU" dirty="0">
@@ -7656,16 +7491,6 @@
               <a:t>HTML-</a:t>
             </a:r>
             <a:r>
-              <a:rPr lang="ru-RU" dirty="0" err="1">
-                <a:solidFill>
-                  <a:schemeClr val="dk1"/>
-                </a:solidFill>
-                <a:latin typeface="Calibri" panose="020F0502020204030204" pitchFamily="34" charset="0"/>
-                <a:cs typeface="Calibri" panose="020F0502020204030204" pitchFamily="34" charset="0"/>
-              </a:rPr>
-              <a:t>парсер</a:t>
-            </a:r>
-            <a:r>
               <a:rPr lang="ru-RU" dirty="0">
                 <a:solidFill>
                   <a:schemeClr val="dk1"/>
@@ -7673,17 +7498,7 @@
                 <a:latin typeface="Calibri" panose="020F0502020204030204" pitchFamily="34" charset="0"/>
                 <a:cs typeface="Calibri" panose="020F0502020204030204" pitchFamily="34" charset="0"/>
               </a:rPr>
-              <a:t> </a:t>
-            </a:r>
-            <a:r>
-              <a:rPr lang="en-US" dirty="0" err="1">
-                <a:solidFill>
-                  <a:schemeClr val="dk1"/>
-                </a:solidFill>
-                <a:latin typeface="Calibri" panose="020F0502020204030204" pitchFamily="34" charset="0"/>
-                <a:cs typeface="Calibri" panose="020F0502020204030204" pitchFamily="34" charset="0"/>
-              </a:rPr>
-              <a:t>lxml</a:t>
+              <a:t>парсер </a:t>
             </a:r>
             <a:r>
               <a:rPr lang="en-US" dirty="0">
@@ -7693,7 +7508,7 @@
                 <a:latin typeface="Calibri" panose="020F0502020204030204" pitchFamily="34" charset="0"/>
                 <a:cs typeface="Calibri" panose="020F0502020204030204" pitchFamily="34" charset="0"/>
               </a:rPr>
-              <a:t> </a:t>
+              <a:t>lxml </a:t>
             </a:r>
             <a:r>
               <a:rPr lang="ru-RU" dirty="0">
@@ -7793,27 +7608,7 @@
                 <a:latin typeface="Calibri" panose="020F0502020204030204" pitchFamily="34" charset="0"/>
                 <a:cs typeface="Calibri" panose="020F0502020204030204" pitchFamily="34" charset="0"/>
               </a:rPr>
-              <a:t>понимать, что сервер может отлавливать программы-боты и кидать пользователя в </a:t>
-            </a:r>
-            <a:r>
-              <a:rPr lang="ru-RU" dirty="0" err="1">
-                <a:solidFill>
-                  <a:schemeClr val="dk1"/>
-                </a:solidFill>
-                <a:latin typeface="Calibri" panose="020F0502020204030204" pitchFamily="34" charset="0"/>
-                <a:cs typeface="Calibri" panose="020F0502020204030204" pitchFamily="34" charset="0"/>
-              </a:rPr>
-              <a:t>бан</a:t>
-            </a:r>
-            <a:r>
-              <a:rPr lang="ru-RU" dirty="0">
-                <a:solidFill>
-                  <a:schemeClr val="dk1"/>
-                </a:solidFill>
-                <a:latin typeface="Calibri" panose="020F0502020204030204" pitchFamily="34" charset="0"/>
-                <a:cs typeface="Calibri" panose="020F0502020204030204" pitchFamily="34" charset="0"/>
-              </a:rPr>
-              <a:t>, что приводит к необходимости создания </a:t>
+              <a:t>понимать, что сервер может отлавливать программы-боты и кидать пользователя в бан, что приводит к необходимости создания </a:t>
             </a:r>
             <a:r>
               <a:rPr lang="ru-RU" dirty="0" smtClean="0">
@@ -8241,35 +8036,7 @@
                 <a:latin typeface="Calibri" panose="020F0502020204030204" pitchFamily="34" charset="0"/>
                 <a:cs typeface="Calibri" panose="020F0502020204030204" pitchFamily="34" charset="0"/>
               </a:rPr>
-              <a:t>Что такое </a:t>
-            </a:r>
-            <a:r>
-              <a:rPr lang="ru-RU" sz="4000" b="1" dirty="0" err="1" smtClean="0">
-                <a:latin typeface="Calibri" panose="020F0502020204030204" pitchFamily="34" charset="0"/>
-                <a:cs typeface="Calibri" panose="020F0502020204030204" pitchFamily="34" charset="0"/>
-              </a:rPr>
-              <a:t>скрейпинг</a:t>
-            </a:r>
-            <a:r>
-              <a:rPr lang="ru-RU" sz="4000" b="1" dirty="0" smtClean="0">
-                <a:latin typeface="Calibri" panose="020F0502020204030204" pitchFamily="34" charset="0"/>
-                <a:cs typeface="Calibri" panose="020F0502020204030204" pitchFamily="34" charset="0"/>
-              </a:rPr>
-              <a:t> и </a:t>
-            </a:r>
-            <a:r>
-              <a:rPr lang="ru-RU" sz="4000" b="1" dirty="0" err="1" smtClean="0">
-                <a:latin typeface="Calibri" panose="020F0502020204030204" pitchFamily="34" charset="0"/>
-                <a:cs typeface="Calibri" panose="020F0502020204030204" pitchFamily="34" charset="0"/>
-              </a:rPr>
-              <a:t>парсинг</a:t>
-            </a:r>
-            <a:r>
-              <a:rPr lang="ru-RU" sz="4000" b="1" dirty="0" smtClean="0">
-                <a:latin typeface="Calibri" panose="020F0502020204030204" pitchFamily="34" charset="0"/>
-                <a:cs typeface="Calibri" panose="020F0502020204030204" pitchFamily="34" charset="0"/>
-              </a:rPr>
-              <a:t>?</a:t>
+              <a:t>Что такое скрейпинг и парсинг?</a:t>
             </a:r>
             <a:endParaRPr lang="ru-RU" sz="4000" b="1" dirty="0">
               <a:latin typeface="Calibri" panose="020F0502020204030204" pitchFamily="34" charset="0"/>
@@ -8302,7 +8069,7 @@
               <a:buNone/>
             </a:pPr>
             <a:r>
-              <a:rPr lang="ru-RU" sz="2400" b="1" dirty="0" err="1" smtClean="0">
+              <a:rPr lang="ru-RU" sz="2400" b="1" dirty="0" smtClean="0">
                 <a:latin typeface="Calibri" panose="020F0502020204030204" pitchFamily="34" charset="0"/>
                 <a:cs typeface="Calibri" panose="020F0502020204030204" pitchFamily="34" charset="0"/>
               </a:rPr>
@@ -8330,14 +8097,14 @@
               <a:buNone/>
             </a:pPr>
             <a:r>
-              <a:rPr lang="ru-RU" sz="2400" b="1" dirty="0" err="1">
+              <a:rPr lang="ru-RU" sz="2400" b="1" dirty="0">
                 <a:latin typeface="Calibri" panose="020F0502020204030204" pitchFamily="34" charset="0"/>
                 <a:cs typeface="Calibri" panose="020F0502020204030204" pitchFamily="34" charset="0"/>
               </a:rPr>
               <a:t>П</a:t>
             </a:r>
             <a:r>
-              <a:rPr lang="ru-RU" sz="2400" b="1" dirty="0" err="1" smtClean="0">
+              <a:rPr lang="ru-RU" sz="2400" b="1" dirty="0" smtClean="0">
                 <a:latin typeface="Calibri" panose="020F0502020204030204" pitchFamily="34" charset="0"/>
                 <a:cs typeface="Calibri" panose="020F0502020204030204" pitchFamily="34" charset="0"/>
               </a:rPr>
@@ -8348,21 +8115,7 @@
                 <a:latin typeface="Calibri" panose="020F0502020204030204" pitchFamily="34" charset="0"/>
                 <a:cs typeface="Calibri" panose="020F0502020204030204" pitchFamily="34" charset="0"/>
               </a:rPr>
-              <a:t> – это этап </a:t>
-            </a:r>
-            <a:r>
-              <a:rPr lang="ru-RU" sz="2400" dirty="0" err="1" smtClean="0">
-                <a:latin typeface="Calibri" panose="020F0502020204030204" pitchFamily="34" charset="0"/>
-                <a:cs typeface="Calibri" panose="020F0502020204030204" pitchFamily="34" charset="0"/>
-              </a:rPr>
-              <a:t>скрейпинга</a:t>
-            </a:r>
-            <a:r>
-              <a:rPr lang="ru-RU" sz="2400" dirty="0" smtClean="0">
-                <a:latin typeface="Calibri" panose="020F0502020204030204" pitchFamily="34" charset="0"/>
-                <a:cs typeface="Calibri" panose="020F0502020204030204" pitchFamily="34" charset="0"/>
-              </a:rPr>
-              <a:t>, на </a:t>
+              <a:t> – это этап скрейпинга, на </a:t>
             </a:r>
             <a:r>
               <a:rPr lang="ru-RU" sz="2400" dirty="0">
@@ -8675,42 +8428,21 @@
                 <a:latin typeface="Calibri" panose="020F0502020204030204" pitchFamily="34" charset="0"/>
                 <a:cs typeface="Calibri" panose="020F0502020204030204" pitchFamily="34" charset="0"/>
               </a:rPr>
-              <a:t>В данном проекте </a:t>
-            </a:r>
-            <a:r>
-              <a:rPr lang="ru-RU" sz="2400" dirty="0" err="1" smtClean="0">
-                <a:latin typeface="Calibri" panose="020F0502020204030204" pitchFamily="34" charset="0"/>
-                <a:cs typeface="Calibri" panose="020F0502020204030204" pitchFamily="34" charset="0"/>
-              </a:rPr>
-              <a:t>скрейпинг</a:t>
+              <a:t>В данном проекте скрейпинг/</a:t>
+            </a:r>
+            <a:r>
+              <a:rPr lang="ru-RU" sz="2400" dirty="0">
+                <a:latin typeface="Calibri" panose="020F0502020204030204" pitchFamily="34" charset="0"/>
+                <a:cs typeface="Calibri" panose="020F0502020204030204" pitchFamily="34" charset="0"/>
+              </a:rPr>
+              <a:t>п</a:t>
             </a:r>
             <a:r>
               <a:rPr lang="ru-RU" sz="2400" dirty="0" smtClean="0">
                 <a:latin typeface="Calibri" panose="020F0502020204030204" pitchFamily="34" charset="0"/>
                 <a:cs typeface="Calibri" panose="020F0502020204030204" pitchFamily="34" charset="0"/>
               </a:rPr>
-              <a:t>/</a:t>
-            </a:r>
-            <a:r>
-              <a:rPr lang="ru-RU" sz="2400" dirty="0" err="1">
-                <a:latin typeface="Calibri" panose="020F0502020204030204" pitchFamily="34" charset="0"/>
-                <a:cs typeface="Calibri" panose="020F0502020204030204" pitchFamily="34" charset="0"/>
-              </a:rPr>
-              <a:t>п</a:t>
-            </a:r>
-            <a:r>
-              <a:rPr lang="ru-RU" sz="2400" dirty="0" err="1" smtClean="0">
-                <a:latin typeface="Calibri" panose="020F0502020204030204" pitchFamily="34" charset="0"/>
-                <a:cs typeface="Calibri" panose="020F0502020204030204" pitchFamily="34" charset="0"/>
-              </a:rPr>
-              <a:t>арсинг</a:t>
-            </a:r>
-            <a:r>
-              <a:rPr lang="ru-RU" sz="2400" dirty="0" smtClean="0">
-                <a:latin typeface="Calibri" panose="020F0502020204030204" pitchFamily="34" charset="0"/>
-                <a:cs typeface="Calibri" panose="020F0502020204030204" pitchFamily="34" charset="0"/>
-              </a:rPr>
-              <a:t> используются для получения данных каталога одного известного интернет-магазина.</a:t>
+              <a:t>арсинг используются для получения данных каталога одного известного интернет-магазина.</a:t>
             </a:r>
           </a:p>
           <a:p>
@@ -9077,35 +8809,7 @@
                 <a:latin typeface="Calibri" panose="020F0502020204030204" pitchFamily="34" charset="0"/>
                 <a:cs typeface="Calibri" panose="020F0502020204030204" pitchFamily="34" charset="0"/>
               </a:rPr>
-              <a:t>Создаёт дерево синтаксического анализа для проанализированных страниц, которое можно использовать для извлечения данных из файлов данных форматов, что весьма экономит время при </a:t>
-            </a:r>
-            <a:r>
-              <a:rPr lang="ru-RU" sz="2000" dirty="0" err="1" smtClean="0">
-                <a:latin typeface="Calibri" panose="020F0502020204030204" pitchFamily="34" charset="0"/>
-                <a:cs typeface="Calibri" panose="020F0502020204030204" pitchFamily="34" charset="0"/>
-              </a:rPr>
-              <a:t>скрейпинге</a:t>
-            </a:r>
-            <a:r>
-              <a:rPr lang="ru-RU" sz="2000" dirty="0" smtClean="0">
-                <a:latin typeface="Calibri" panose="020F0502020204030204" pitchFamily="34" charset="0"/>
-                <a:cs typeface="Calibri" panose="020F0502020204030204" pitchFamily="34" charset="0"/>
-              </a:rPr>
-              <a:t>/</a:t>
-            </a:r>
-            <a:r>
-              <a:rPr lang="ru-RU" sz="2000" dirty="0" err="1" smtClean="0">
-                <a:latin typeface="Calibri" panose="020F0502020204030204" pitchFamily="34" charset="0"/>
-                <a:cs typeface="Calibri" panose="020F0502020204030204" pitchFamily="34" charset="0"/>
-              </a:rPr>
-              <a:t>парсинге</a:t>
-            </a:r>
-            <a:r>
-              <a:rPr lang="ru-RU" sz="2000" dirty="0" smtClean="0">
-                <a:latin typeface="Calibri" panose="020F0502020204030204" pitchFamily="34" charset="0"/>
-                <a:cs typeface="Calibri" panose="020F0502020204030204" pitchFamily="34" charset="0"/>
-              </a:rPr>
-              <a:t>.</a:t>
+              <a:t>Создаёт дерево синтаксического анализа для проанализированных страниц, которое можно использовать для извлечения данных из файлов данных форматов, что весьма экономит время при скрейпинге/парсинге.</a:t>
             </a:r>
             <a:r>
               <a:rPr lang="en-US" sz="2000" dirty="0" smtClean="0">
@@ -9128,91 +8832,49 @@
                 <a:latin typeface="Calibri" panose="020F0502020204030204" pitchFamily="34" charset="0"/>
                 <a:cs typeface="Calibri" panose="020F0502020204030204" pitchFamily="34" charset="0"/>
               </a:rPr>
-              <a:t>В проекте используется </a:t>
-            </a:r>
-            <a:r>
-              <a:rPr lang="ru-RU" sz="2000" i="1" dirty="0" err="1" smtClean="0">
-                <a:latin typeface="Calibri" panose="020F0502020204030204" pitchFamily="34" charset="0"/>
-                <a:cs typeface="Calibri" panose="020F0502020204030204" pitchFamily="34" charset="0"/>
-              </a:rPr>
-              <a:t>парсер</a:t>
+              <a:t>В проекте используется парсер </a:t>
+            </a:r>
+            <a:r>
+              <a:rPr lang="en-US" sz="2000" i="1" dirty="0" smtClean="0">
+                <a:latin typeface="Calibri" panose="020F0502020204030204" pitchFamily="34" charset="0"/>
+                <a:cs typeface="Calibri" panose="020F0502020204030204" pitchFamily="34" charset="0"/>
+              </a:rPr>
+              <a:t>Python html</a:t>
+            </a:r>
+            <a:r>
+              <a:rPr lang="ru-RU" sz="2000" i="1" dirty="0">
+                <a:latin typeface="Calibri" panose="020F0502020204030204" pitchFamily="34" charset="0"/>
+                <a:cs typeface="Calibri" panose="020F0502020204030204" pitchFamily="34" charset="0"/>
+              </a:rPr>
+              <a:t>.</a:t>
+            </a:r>
+            <a:r>
+              <a:rPr lang="en-US" sz="2000" i="1" dirty="0" smtClean="0">
+                <a:latin typeface="Calibri" panose="020F0502020204030204" pitchFamily="34" charset="0"/>
+                <a:cs typeface="Calibri" panose="020F0502020204030204" pitchFamily="34" charset="0"/>
+              </a:rPr>
+              <a:t>parser </a:t>
             </a:r>
             <a:r>
               <a:rPr lang="ru-RU" sz="2000" i="1" dirty="0" smtClean="0">
                 <a:latin typeface="Calibri" panose="020F0502020204030204" pitchFamily="34" charset="0"/>
                 <a:cs typeface="Calibri" panose="020F0502020204030204" pitchFamily="34" charset="0"/>
               </a:rPr>
-              <a:t> </a:t>
+              <a:t>в виду своей встроенности, приемлемой скорости работы и подходящей обработки </a:t>
             </a:r>
             <a:r>
               <a:rPr lang="en-US" sz="2000" i="1" dirty="0" smtClean="0">
                 <a:latin typeface="Calibri" panose="020F0502020204030204" pitchFamily="34" charset="0"/>
                 <a:cs typeface="Calibri" panose="020F0502020204030204" pitchFamily="34" charset="0"/>
               </a:rPr>
-              <a:t>Python html</a:t>
-            </a:r>
-            <a:r>
-              <a:rPr lang="ru-RU" sz="2000" i="1" dirty="0">
-                <a:latin typeface="Calibri" panose="020F0502020204030204" pitchFamily="34" charset="0"/>
-                <a:cs typeface="Calibri" panose="020F0502020204030204" pitchFamily="34" charset="0"/>
-              </a:rPr>
-              <a:t>.</a:t>
-            </a:r>
-            <a:r>
-              <a:rPr lang="en-US" sz="2000" i="1" dirty="0" smtClean="0">
-                <a:latin typeface="Calibri" panose="020F0502020204030204" pitchFamily="34" charset="0"/>
-                <a:cs typeface="Calibri" panose="020F0502020204030204" pitchFamily="34" charset="0"/>
-              </a:rPr>
-              <a:t>parser </a:t>
+              <a:t>html-</a:t>
             </a:r>
             <a:r>
               <a:rPr lang="ru-RU" sz="2000" i="1" dirty="0" smtClean="0">
                 <a:latin typeface="Calibri" panose="020F0502020204030204" pitchFamily="34" charset="0"/>
                 <a:cs typeface="Calibri" panose="020F0502020204030204" pitchFamily="34" charset="0"/>
               </a:rPr>
-              <a:t>в виду своей </a:t>
-            </a:r>
-            <a:r>
-              <a:rPr lang="ru-RU" sz="2000" i="1" dirty="0" err="1" smtClean="0">
-                <a:latin typeface="Calibri" panose="020F0502020204030204" pitchFamily="34" charset="0"/>
-                <a:cs typeface="Calibri" panose="020F0502020204030204" pitchFamily="34" charset="0"/>
-              </a:rPr>
-              <a:t>встроенности</a:t>
-            </a:r>
-            <a:r>
-              <a:rPr lang="ru-RU" sz="2000" i="1" dirty="0" smtClean="0">
-                <a:latin typeface="Calibri" panose="020F0502020204030204" pitchFamily="34" charset="0"/>
-                <a:cs typeface="Calibri" panose="020F0502020204030204" pitchFamily="34" charset="0"/>
-              </a:rPr>
-              <a:t>, приемлемой скорости работы и подходящей обработки </a:t>
-            </a:r>
-            <a:r>
-              <a:rPr lang="en-US" sz="2000" i="1" dirty="0" smtClean="0">
-                <a:latin typeface="Calibri" panose="020F0502020204030204" pitchFamily="34" charset="0"/>
-                <a:cs typeface="Calibri" panose="020F0502020204030204" pitchFamily="34" charset="0"/>
-              </a:rPr>
-              <a:t>html-</a:t>
-            </a:r>
-            <a:r>
-              <a:rPr lang="ru-RU" sz="2000" i="1" dirty="0" smtClean="0">
-                <a:latin typeface="Calibri" panose="020F0502020204030204" pitchFamily="34" charset="0"/>
-                <a:cs typeface="Calibri" panose="020F0502020204030204" pitchFamily="34" charset="0"/>
-              </a:rPr>
-              <a:t>страниц, выбранного для </a:t>
-            </a:r>
-            <a:r>
-              <a:rPr lang="ru-RU" sz="2000" i="1" dirty="0" err="1" smtClean="0">
-                <a:latin typeface="Calibri" panose="020F0502020204030204" pitchFamily="34" charset="0"/>
-                <a:cs typeface="Calibri" panose="020F0502020204030204" pitchFamily="34" charset="0"/>
-              </a:rPr>
-              <a:t>парсинга</a:t>
-            </a:r>
-            <a:r>
-              <a:rPr lang="ru-RU" sz="2000" i="1" dirty="0" smtClean="0">
-                <a:latin typeface="Calibri" panose="020F0502020204030204" pitchFamily="34" charset="0"/>
-                <a:cs typeface="Calibri" panose="020F0502020204030204" pitchFamily="34" charset="0"/>
-              </a:rPr>
-              <a:t> сайта.</a:t>
+              <a:t>страниц, выбранного для парсинга сайта.</a:t>
             </a:r>
           </a:p>
         </p:txBody>
@@ -9399,7 +9061,7 @@
                     <a:p>
                       <a:pPr algn="ctr"/>
                       <a:r>
-                        <a:rPr lang="ru-RU" sz="1400" dirty="0" err="1" smtClean="0">
+                        <a:rPr lang="ru-RU" sz="1400" dirty="0" smtClean="0">
                           <a:latin typeface="Calibri" panose="020F0502020204030204" pitchFamily="34" charset="0"/>
                           <a:cs typeface="Calibri" panose="020F0502020204030204" pitchFamily="34" charset="0"/>
                         </a:rPr>
@@ -9424,14 +9086,7 @@
                           <a:latin typeface="Calibri" panose="020F0502020204030204" pitchFamily="34" charset="0"/>
                           <a:cs typeface="Calibri" panose="020F0502020204030204" pitchFamily="34" charset="0"/>
                         </a:rPr>
-                        <a:t>Типичное </a:t>
-                      </a:r>
-                      <a:r>
-                        <a:rPr lang="ru-RU" sz="1400" dirty="0" err="1" smtClean="0">
-                          <a:latin typeface="Calibri" panose="020F0502020204030204" pitchFamily="34" charset="0"/>
-                          <a:cs typeface="Calibri" panose="020F0502020204030204" pitchFamily="34" charset="0"/>
-                        </a:rPr>
-                        <a:t>использовние</a:t>
+                        <a:t>Типичное использовние</a:t>
                       </a:r>
                       <a:endParaRPr lang="ru-RU" sz="1400" dirty="0">
                         <a:latin typeface="Calibri" panose="020F0502020204030204" pitchFamily="34" charset="0"/>
@@ -9505,19 +9160,7 @@
                           <a:ea typeface="+mn-ea"/>
                           <a:cs typeface="Calibri" panose="020F0502020204030204" pitchFamily="34" charset="0"/>
                         </a:rPr>
-                        <a:t>Python </a:t>
-                      </a:r>
-                      <a:r>
-                        <a:rPr lang="en-US" sz="1400" b="0" i="0" kern="1200" dirty="0" err="1" smtClean="0">
-                          <a:solidFill>
-                            <a:schemeClr val="dk1"/>
-                          </a:solidFill>
-                          <a:effectLst/>
-                          <a:latin typeface="Calibri" panose="020F0502020204030204" pitchFamily="34" charset="0"/>
-                          <a:ea typeface="+mn-ea"/>
-                          <a:cs typeface="Calibri" panose="020F0502020204030204" pitchFamily="34" charset="0"/>
-                        </a:rPr>
-                        <a:t>html.parser</a:t>
+                        <a:t>Python html.parser</a:t>
                       </a:r>
                       <a:endParaRPr lang="ru-RU" sz="1400" b="0" i="0" kern="1200" dirty="0">
                         <a:solidFill>
@@ -9538,18 +9181,6 @@
                     <a:lstStyle/>
                     <a:p>
                       <a:r>
-                        <a:rPr lang="en-US" sz="1400" b="0" i="0" kern="1200" dirty="0" err="1" smtClean="0">
-                          <a:solidFill>
-                            <a:schemeClr val="dk1"/>
-                          </a:solidFill>
-                          <a:effectLst/>
-                          <a:latin typeface="Calibri" panose="020F0502020204030204" pitchFamily="34" charset="0"/>
-                          <a:ea typeface="+mn-ea"/>
-                          <a:cs typeface="Calibri" panose="020F0502020204030204" pitchFamily="34" charset="0"/>
-                        </a:rPr>
-                        <a:t>BeautifulSoup</a:t>
-                      </a:r>
-                      <a:r>
                         <a:rPr lang="en-US" sz="1400" b="0" i="0" kern="1200" dirty="0" smtClean="0">
                           <a:solidFill>
                             <a:schemeClr val="dk1"/>
@@ -9559,7 +9190,7 @@
                           <a:ea typeface="+mn-ea"/>
                           <a:cs typeface="Calibri" panose="020F0502020204030204" pitchFamily="34" charset="0"/>
                         </a:rPr>
-                        <a:t> (</a:t>
+                        <a:t>BeautifulSoup (</a:t>
                       </a:r>
                       <a:r>
                         <a:rPr lang="ru-RU" sz="1400" b="0" i="0" kern="1200" dirty="0" smtClean="0">
@@ -9574,18 +9205,6 @@
                         <a:t>разметка, "</a:t>
                       </a:r>
                       <a:r>
-                        <a:rPr lang="en-US" sz="1400" b="0" i="0" kern="1200" dirty="0" err="1" smtClean="0">
-                          <a:solidFill>
-                            <a:schemeClr val="dk1"/>
-                          </a:solidFill>
-                          <a:effectLst/>
-                          <a:latin typeface="Calibri" panose="020F0502020204030204" pitchFamily="34" charset="0"/>
-                          <a:ea typeface="+mn-ea"/>
-                          <a:cs typeface="Calibri" panose="020F0502020204030204" pitchFamily="34" charset="0"/>
-                        </a:rPr>
-                        <a:t>html.parser</a:t>
-                      </a:r>
-                      <a:r>
                         <a:rPr lang="en-US" sz="1400" b="0" i="0" kern="1200" dirty="0" smtClean="0">
                           <a:solidFill>
                             <a:schemeClr val="dk1"/>
@@ -9595,7 +9214,7 @@
                           <a:ea typeface="+mn-ea"/>
                           <a:cs typeface="Calibri" panose="020F0502020204030204" pitchFamily="34" charset="0"/>
                         </a:rPr>
-                        <a:t>")</a:t>
+                        <a:t>html.parser")</a:t>
                       </a:r>
                       <a:endParaRPr lang="ru-RU" sz="1400" b="0" i="0" kern="1200" dirty="0">
                         <a:solidFill>
@@ -9647,31 +9266,7 @@
                           <a:ea typeface="+mn-ea"/>
                           <a:cs typeface="Calibri" panose="020F0502020204030204" pitchFamily="34" charset="0"/>
                         </a:rPr>
-                        <a:t>Снисходительный (начиная с </a:t>
-                      </a:r>
-                      <a:r>
-                        <a:rPr lang="ru-RU" sz="1400" b="0" i="0" kern="1200" dirty="0" err="1" smtClean="0">
-                          <a:solidFill>
-                            <a:schemeClr val="dk1"/>
-                          </a:solidFill>
-                          <a:effectLst/>
-                          <a:latin typeface="Calibri" panose="020F0502020204030204" pitchFamily="34" charset="0"/>
-                          <a:ea typeface="+mn-ea"/>
-                          <a:cs typeface="Calibri" panose="020F0502020204030204" pitchFamily="34" charset="0"/>
-                        </a:rPr>
-                        <a:t>Python</a:t>
-                      </a:r>
-                      <a:r>
-                        <a:rPr lang="ru-RU" sz="1400" b="0" i="0" kern="1200" dirty="0" smtClean="0">
-                          <a:solidFill>
-                            <a:schemeClr val="dk1"/>
-                          </a:solidFill>
-                          <a:effectLst/>
-                          <a:latin typeface="Calibri" panose="020F0502020204030204" pitchFamily="34" charset="0"/>
-                          <a:ea typeface="+mn-ea"/>
-                          <a:cs typeface="Calibri" panose="020F0502020204030204" pitchFamily="34" charset="0"/>
-                        </a:rPr>
-                        <a:t> 2.7.3 и 3.2.)</a:t>
+                        <a:t>Снисходительный (начиная с Python 2.7.3 и 3.2.)</a:t>
                       </a:r>
                     </a:p>
                   </a:txBody>
@@ -9709,31 +9304,7 @@
                           <a:ea typeface="+mn-ea"/>
                           <a:cs typeface="Calibri" panose="020F0502020204030204" pitchFamily="34" charset="0"/>
                         </a:rPr>
-                        <a:t>Не так быстро, как </a:t>
-                      </a:r>
-                      <a:r>
-                        <a:rPr lang="ru-RU" sz="1400" b="0" i="0" kern="1200" dirty="0" err="1" smtClean="0">
-                          <a:solidFill>
-                            <a:schemeClr val="dk1"/>
-                          </a:solidFill>
-                          <a:effectLst/>
-                          <a:latin typeface="Calibri" panose="020F0502020204030204" pitchFamily="34" charset="0"/>
-                          <a:ea typeface="+mn-ea"/>
-                          <a:cs typeface="Calibri" panose="020F0502020204030204" pitchFamily="34" charset="0"/>
-                        </a:rPr>
-                        <a:t>lxml</a:t>
-                      </a:r>
-                      <a:r>
-                        <a:rPr lang="ru-RU" sz="1400" b="0" i="0" kern="1200" dirty="0" smtClean="0">
-                          <a:solidFill>
-                            <a:schemeClr val="dk1"/>
-                          </a:solidFill>
-                          <a:effectLst/>
-                          <a:latin typeface="Calibri" panose="020F0502020204030204" pitchFamily="34" charset="0"/>
-                          <a:ea typeface="+mn-ea"/>
-                          <a:cs typeface="Calibri" panose="020F0502020204030204" pitchFamily="34" charset="0"/>
-                        </a:rPr>
-                        <a:t>, менее мягко, чем html5lib</a:t>
+                        <a:t>Не так быстро, как lxml, менее мягко, чем html5lib</a:t>
                       </a:r>
                     </a:p>
                   </a:txBody>
@@ -9764,18 +9335,6 @@
                         <a:t>HTML-</a:t>
                       </a:r>
                       <a:r>
-                        <a:rPr lang="ru-RU" sz="1400" b="0" i="0" kern="1200" dirty="0" err="1" smtClean="0">
-                          <a:solidFill>
-                            <a:schemeClr val="dk1"/>
-                          </a:solidFill>
-                          <a:effectLst/>
-                          <a:latin typeface="Calibri" panose="020F0502020204030204" pitchFamily="34" charset="0"/>
-                          <a:ea typeface="+mn-ea"/>
-                          <a:cs typeface="Calibri" panose="020F0502020204030204" pitchFamily="34" charset="0"/>
-                        </a:rPr>
-                        <a:t>парсер</a:t>
-                      </a:r>
-                      <a:r>
                         <a:rPr lang="ru-RU" sz="1400" b="0" i="0" kern="1200" dirty="0" smtClean="0">
                           <a:solidFill>
                             <a:schemeClr val="dk1"/>
@@ -9785,10 +9344,10 @@
                           <a:ea typeface="+mn-ea"/>
                           <a:cs typeface="Calibri" panose="020F0502020204030204" pitchFamily="34" charset="0"/>
                         </a:rPr>
-                        <a:t> </a:t>
+                        <a:t>парсер </a:t>
                       </a:r>
                       <a:r>
-                        <a:rPr lang="en-US" sz="1400" b="0" i="0" kern="1200" dirty="0" err="1" smtClean="0">
+                        <a:rPr lang="en-US" sz="1400" b="0" i="0" kern="1200" dirty="0" smtClean="0">
                           <a:solidFill>
                             <a:schemeClr val="dk1"/>
                           </a:solidFill>
@@ -9813,18 +9372,6 @@
                     <a:lstStyle/>
                     <a:p>
                       <a:r>
-                        <a:rPr lang="en-US" sz="1400" b="0" i="0" kern="1200" dirty="0" err="1" smtClean="0">
-                          <a:solidFill>
-                            <a:schemeClr val="dk1"/>
-                          </a:solidFill>
-                          <a:effectLst/>
-                          <a:latin typeface="Calibri" panose="020F0502020204030204" pitchFamily="34" charset="0"/>
-                          <a:ea typeface="+mn-ea"/>
-                          <a:cs typeface="Calibri" panose="020F0502020204030204" pitchFamily="34" charset="0"/>
-                        </a:rPr>
-                        <a:t>BeautifulSoup</a:t>
-                      </a:r>
-                      <a:r>
                         <a:rPr lang="en-US" sz="1400" b="0" i="0" kern="1200" dirty="0" smtClean="0">
                           <a:solidFill>
                             <a:schemeClr val="dk1"/>
@@ -9834,7 +9381,7 @@
                           <a:ea typeface="+mn-ea"/>
                           <a:cs typeface="Calibri" panose="020F0502020204030204" pitchFamily="34" charset="0"/>
                         </a:rPr>
-                        <a:t> (</a:t>
+                        <a:t>BeautifulSoup (</a:t>
                       </a:r>
                       <a:r>
                         <a:rPr lang="ru-RU" sz="1400" b="0" i="0" kern="1200" dirty="0" smtClean="0">
@@ -9849,18 +9396,6 @@
                         <a:t>разметка, «</a:t>
                       </a:r>
                       <a:r>
-                        <a:rPr lang="en-US" sz="1400" b="0" i="0" kern="1200" dirty="0" err="1" smtClean="0">
-                          <a:solidFill>
-                            <a:schemeClr val="dk1"/>
-                          </a:solidFill>
-                          <a:effectLst/>
-                          <a:latin typeface="Calibri" panose="020F0502020204030204" pitchFamily="34" charset="0"/>
-                          <a:ea typeface="+mn-ea"/>
-                          <a:cs typeface="Calibri" panose="020F0502020204030204" pitchFamily="34" charset="0"/>
-                        </a:rPr>
-                        <a:t>lxml</a:t>
-                      </a:r>
-                      <a:r>
                         <a:rPr lang="en-US" sz="1400" b="0" i="0" kern="1200" dirty="0" smtClean="0">
                           <a:solidFill>
                             <a:schemeClr val="dk1"/>
@@ -9870,7 +9405,7 @@
                           <a:ea typeface="+mn-ea"/>
                           <a:cs typeface="Calibri" panose="020F0502020204030204" pitchFamily="34" charset="0"/>
                         </a:rPr>
-                        <a:t>»)</a:t>
+                        <a:t>lxml»)</a:t>
                       </a:r>
                       <a:endParaRPr lang="ru-RU" sz="1400" dirty="0">
                         <a:latin typeface="Calibri" panose="020F0502020204030204" pitchFamily="34" charset="0"/>
@@ -10002,18 +9537,6 @@
                         <a:t>XML-</a:t>
                       </a:r>
                       <a:r>
-                        <a:rPr lang="ru-RU" sz="1400" b="0" i="0" kern="1200" dirty="0" err="1" smtClean="0">
-                          <a:solidFill>
-                            <a:schemeClr val="dk1"/>
-                          </a:solidFill>
-                          <a:effectLst/>
-                          <a:latin typeface="Calibri" panose="020F0502020204030204" pitchFamily="34" charset="0"/>
-                          <a:ea typeface="+mn-ea"/>
-                          <a:cs typeface="Calibri" panose="020F0502020204030204" pitchFamily="34" charset="0"/>
-                        </a:rPr>
-                        <a:t>парсер</a:t>
-                      </a:r>
-                      <a:r>
                         <a:rPr lang="ru-RU" sz="1400" b="0" i="0" kern="1200" dirty="0" smtClean="0">
                           <a:solidFill>
                             <a:schemeClr val="dk1"/>
@@ -10023,10 +9546,10 @@
                           <a:ea typeface="+mn-ea"/>
                           <a:cs typeface="Calibri" panose="020F0502020204030204" pitchFamily="34" charset="0"/>
                         </a:rPr>
-                        <a:t> </a:t>
+                        <a:t>парсер </a:t>
                       </a:r>
                       <a:r>
-                        <a:rPr lang="en-US" sz="1400" b="0" i="0" kern="1200" dirty="0" err="1" smtClean="0">
+                        <a:rPr lang="en-US" sz="1400" b="0" i="0" kern="1200" dirty="0" smtClean="0">
                           <a:solidFill>
                             <a:schemeClr val="dk1"/>
                           </a:solidFill>
@@ -10051,18 +9574,6 @@
                     <a:lstStyle/>
                     <a:p>
                       <a:r>
-                        <a:rPr lang="en-US" sz="1400" b="0" i="0" kern="1200" dirty="0" err="1" smtClean="0">
-                          <a:solidFill>
-                            <a:schemeClr val="dk1"/>
-                          </a:solidFill>
-                          <a:effectLst/>
-                          <a:latin typeface="Calibri" panose="020F0502020204030204" pitchFamily="34" charset="0"/>
-                          <a:ea typeface="+mn-ea"/>
-                          <a:cs typeface="Calibri" panose="020F0502020204030204" pitchFamily="34" charset="0"/>
-                        </a:rPr>
-                        <a:t>BeautifulSoup</a:t>
-                      </a:r>
-                      <a:r>
                         <a:rPr lang="en-US" sz="1400" b="0" i="0" kern="1200" dirty="0" smtClean="0">
                           <a:solidFill>
                             <a:schemeClr val="dk1"/>
@@ -10072,7 +9583,7 @@
                           <a:ea typeface="+mn-ea"/>
                           <a:cs typeface="Calibri" panose="020F0502020204030204" pitchFamily="34" charset="0"/>
                         </a:rPr>
-                        <a:t> (</a:t>
+                        <a:t>BeautifulSoup (</a:t>
                       </a:r>
                       <a:r>
                         <a:rPr lang="ru-RU" sz="1400" b="0" i="0" kern="1200" dirty="0" smtClean="0">
@@ -10087,18 +9598,6 @@
                         <a:t>разметка, «</a:t>
                       </a:r>
                       <a:r>
-                        <a:rPr lang="en-US" sz="1400" b="0" i="0" kern="1200" dirty="0" err="1" smtClean="0">
-                          <a:solidFill>
-                            <a:schemeClr val="dk1"/>
-                          </a:solidFill>
-                          <a:effectLst/>
-                          <a:latin typeface="Calibri" panose="020F0502020204030204" pitchFamily="34" charset="0"/>
-                          <a:ea typeface="+mn-ea"/>
-                          <a:cs typeface="Calibri" panose="020F0502020204030204" pitchFamily="34" charset="0"/>
-                        </a:rPr>
-                        <a:t>lxml</a:t>
-                      </a:r>
-                      <a:r>
                         <a:rPr lang="en-US" sz="1400" b="0" i="0" kern="1200" dirty="0" smtClean="0">
                           <a:solidFill>
                             <a:schemeClr val="dk1"/>
@@ -10108,7 +9607,7 @@
                           <a:ea typeface="+mn-ea"/>
                           <a:cs typeface="Calibri" panose="020F0502020204030204" pitchFamily="34" charset="0"/>
                         </a:rPr>
-                        <a:t>-xml»)</a:t>
+                        <a:t>lxml-xml»)</a:t>
                       </a:r>
                       <a:r>
                         <a:rPr lang="en-US" sz="1400" dirty="0" smtClean="0">
@@ -10124,18 +9623,6 @@
                         </a:rPr>
                       </a:br>
                       <a:r>
-                        <a:rPr lang="en-US" sz="1400" b="0" i="0" kern="1200" dirty="0" err="1" smtClean="0">
-                          <a:solidFill>
-                            <a:schemeClr val="dk1"/>
-                          </a:solidFill>
-                          <a:effectLst/>
-                          <a:latin typeface="Calibri" panose="020F0502020204030204" pitchFamily="34" charset="0"/>
-                          <a:ea typeface="+mn-ea"/>
-                          <a:cs typeface="Calibri" panose="020F0502020204030204" pitchFamily="34" charset="0"/>
-                        </a:rPr>
-                        <a:t>BeautifulSoup</a:t>
-                      </a:r>
-                      <a:r>
                         <a:rPr lang="en-US" sz="1400" b="0" i="0" kern="1200" dirty="0" smtClean="0">
                           <a:solidFill>
                             <a:schemeClr val="dk1"/>
@@ -10145,7 +9632,7 @@
                           <a:ea typeface="+mn-ea"/>
                           <a:cs typeface="Calibri" panose="020F0502020204030204" pitchFamily="34" charset="0"/>
                         </a:rPr>
-                        <a:t> (</a:t>
+                        <a:t>BeautifulSoup (</a:t>
                       </a:r>
                       <a:r>
                         <a:rPr lang="ru-RU" sz="1400" b="0" i="0" kern="1200" dirty="0" smtClean="0">
@@ -10314,18 +9801,6 @@
                     <a:lstStyle/>
                     <a:p>
                       <a:r>
-                        <a:rPr lang="en-US" sz="1400" b="0" i="0" kern="1200" dirty="0" err="1" smtClean="0">
-                          <a:solidFill>
-                            <a:schemeClr val="dk1"/>
-                          </a:solidFill>
-                          <a:effectLst/>
-                          <a:latin typeface="Calibri" panose="020F0502020204030204" pitchFamily="34" charset="0"/>
-                          <a:ea typeface="+mn-ea"/>
-                          <a:cs typeface="Calibri" panose="020F0502020204030204" pitchFamily="34" charset="0"/>
-                        </a:rPr>
-                        <a:t>BeautifulSoup</a:t>
-                      </a:r>
-                      <a:r>
                         <a:rPr lang="en-US" sz="1400" b="0" i="0" kern="1200" dirty="0" smtClean="0">
                           <a:solidFill>
                             <a:schemeClr val="dk1"/>
@@ -10335,7 +9810,7 @@
                           <a:ea typeface="+mn-ea"/>
                           <a:cs typeface="Calibri" panose="020F0502020204030204" pitchFamily="34" charset="0"/>
                         </a:rPr>
-                        <a:t> (</a:t>
+                        <a:t>BeautifulSoup (</a:t>
                       </a:r>
                       <a:r>
                         <a:rPr lang="ru-RU" sz="1400" b="0" i="0" kern="1200" dirty="0" smtClean="0">
@@ -10467,29 +9942,8 @@
                           <a:ea typeface="+mn-ea"/>
                           <a:cs typeface="Calibri" panose="020F0502020204030204" pitchFamily="34" charset="0"/>
                         </a:rPr>
-                        <a:t>Внешняя зависимость </a:t>
+                        <a:t>Внешняя зависимость Python</a:t>
                       </a:r>
-                      <a:r>
-                        <a:rPr lang="ru-RU" sz="1400" b="0" i="0" kern="1200" dirty="0" err="1" smtClean="0">
-                          <a:solidFill>
-                            <a:schemeClr val="dk1"/>
-                          </a:solidFill>
-                          <a:effectLst/>
-                          <a:latin typeface="Calibri" panose="020F0502020204030204" pitchFamily="34" charset="0"/>
-                          <a:ea typeface="+mn-ea"/>
-                          <a:cs typeface="Calibri" panose="020F0502020204030204" pitchFamily="34" charset="0"/>
-                        </a:rPr>
-                        <a:t>Python</a:t>
-                      </a:r>
-                      <a:endParaRPr lang="ru-RU" sz="1400" b="0" i="0" kern="1200" dirty="0" smtClean="0">
-                        <a:solidFill>
-                          <a:schemeClr val="dk1"/>
-                        </a:solidFill>
-                        <a:effectLst/>
-                        <a:latin typeface="Calibri" panose="020F0502020204030204" pitchFamily="34" charset="0"/>
-                        <a:ea typeface="+mn-ea"/>
-                        <a:cs typeface="Calibri" panose="020F0502020204030204" pitchFamily="34" charset="0"/>
-                      </a:endParaRPr>
                     </a:p>
                   </a:txBody>
                   <a:tcPr/>
@@ -10665,21 +10119,21 @@
               <a:buNone/>
             </a:pPr>
             <a:r>
-              <a:rPr lang="en-US" sz="2000" b="1" dirty="0" err="1" smtClean="0">
+              <a:rPr lang="en-US" sz="2000" b="1" dirty="0" smtClean="0">
                 <a:latin typeface="Calibri" panose="020F0502020204030204" pitchFamily="34" charset="0"/>
                 <a:cs typeface="Calibri" panose="020F0502020204030204" pitchFamily="34" charset="0"/>
               </a:rPr>
               <a:t>Num</a:t>
             </a:r>
             <a:r>
-              <a:rPr lang="en-US" sz="2000" b="1" dirty="0" err="1">
+              <a:rPr lang="en-US" sz="2000" b="1" dirty="0">
                 <a:latin typeface="Calibri" panose="020F0502020204030204" pitchFamily="34" charset="0"/>
                 <a:cs typeface="Calibri" panose="020F0502020204030204" pitchFamily="34" charset="0"/>
               </a:rPr>
               <a:t>P</a:t>
             </a:r>
             <a:r>
-              <a:rPr lang="en-US" sz="2000" b="1" dirty="0" err="1" smtClean="0">
+              <a:rPr lang="en-US" sz="2000" b="1" dirty="0" smtClean="0">
                 <a:latin typeface="Calibri" panose="020F0502020204030204" pitchFamily="34" charset="0"/>
                 <a:cs typeface="Calibri" panose="020F0502020204030204" pitchFamily="34" charset="0"/>
               </a:rPr>
@@ -10765,7 +10219,7 @@
               <a:buNone/>
             </a:pPr>
             <a:r>
-              <a:rPr lang="en-US" sz="2000" b="1" dirty="0" err="1" smtClean="0">
+              <a:rPr lang="en-US" sz="2000" b="1" dirty="0" smtClean="0">
                 <a:latin typeface="Calibri" panose="020F0502020204030204" pitchFamily="34" charset="0"/>
                 <a:cs typeface="Calibri" panose="020F0502020204030204" pitchFamily="34" charset="0"/>
               </a:rPr>
@@ -10783,176 +10237,148 @@
                 <a:latin typeface="Calibri" panose="020F0502020204030204" pitchFamily="34" charset="0"/>
                 <a:cs typeface="Calibri" panose="020F0502020204030204" pitchFamily="34" charset="0"/>
               </a:rPr>
-              <a:t>модуль </a:t>
-            </a:r>
-            <a:r>
-              <a:rPr lang="ru-RU" sz="2000" dirty="0" err="1" smtClean="0">
-                <a:latin typeface="Calibri" panose="020F0502020204030204" pitchFamily="34" charset="0"/>
-                <a:cs typeface="Calibri" panose="020F0502020204030204" pitchFamily="34" charset="0"/>
-              </a:rPr>
-              <a:t>Python</a:t>
+              <a:t>модуль Python для выведения </a:t>
+            </a:r>
+            <a:r>
+              <a:rPr lang="ru-RU" sz="2000" dirty="0">
+                <a:latin typeface="Calibri" panose="020F0502020204030204" pitchFamily="34" charset="0"/>
+                <a:cs typeface="Calibri" panose="020F0502020204030204" pitchFamily="34" charset="0"/>
+              </a:rPr>
+              <a:t>на консоль динамически </a:t>
             </a:r>
             <a:r>
               <a:rPr lang="ru-RU" sz="2000" dirty="0" smtClean="0">
                 <a:latin typeface="Calibri" panose="020F0502020204030204" pitchFamily="34" charset="0"/>
                 <a:cs typeface="Calibri" panose="020F0502020204030204" pitchFamily="34" charset="0"/>
               </a:rPr>
-              <a:t> для выведения </a:t>
-            </a:r>
-            <a:r>
-              <a:rPr lang="ru-RU" sz="2000" dirty="0">
-                <a:latin typeface="Calibri" panose="020F0502020204030204" pitchFamily="34" charset="0"/>
-                <a:cs typeface="Calibri" panose="020F0502020204030204" pitchFamily="34" charset="0"/>
-              </a:rPr>
-              <a:t>на консоль динамически </a:t>
+              <a:t>обновляемого индикатора выполнения</a:t>
+            </a:r>
+            <a:r>
+              <a:rPr lang="en-US" sz="2000" dirty="0" smtClean="0">
+                <a:latin typeface="Calibri" panose="020F0502020204030204" pitchFamily="34" charset="0"/>
+                <a:cs typeface="Calibri" panose="020F0502020204030204" pitchFamily="34" charset="0"/>
+              </a:rPr>
+              <a:t>.</a:t>
+            </a:r>
+          </a:p>
+          <a:p>
+            <a:pPr marL="0" indent="0">
+              <a:buNone/>
+            </a:pPr>
+            <a:r>
+              <a:rPr lang="en-US" sz="2000" b="1" dirty="0">
+                <a:latin typeface="Calibri" panose="020F0502020204030204" pitchFamily="34" charset="0"/>
+                <a:cs typeface="Calibri" panose="020F0502020204030204" pitchFamily="34" charset="0"/>
+              </a:rPr>
+              <a:t>t</a:t>
+            </a:r>
+            <a:r>
+              <a:rPr lang="en-US" sz="2000" b="1" dirty="0" smtClean="0">
+                <a:latin typeface="Calibri" panose="020F0502020204030204" pitchFamily="34" charset="0"/>
+                <a:cs typeface="Calibri" panose="020F0502020204030204" pitchFamily="34" charset="0"/>
+              </a:rPr>
+              <a:t>ime </a:t>
+            </a:r>
+            <a:r>
+              <a:rPr lang="en-US" sz="2000" dirty="0" smtClean="0">
+                <a:latin typeface="Calibri" panose="020F0502020204030204" pitchFamily="34" charset="0"/>
+                <a:cs typeface="Calibri" panose="020F0502020204030204" pitchFamily="34" charset="0"/>
+              </a:rPr>
+              <a:t>– </a:t>
             </a:r>
             <a:r>
               <a:rPr lang="ru-RU" sz="2000" dirty="0" smtClean="0">
                 <a:latin typeface="Calibri" panose="020F0502020204030204" pitchFamily="34" charset="0"/>
                 <a:cs typeface="Calibri" panose="020F0502020204030204" pitchFamily="34" charset="0"/>
               </a:rPr>
-              <a:t>обновляем</a:t>
+              <a:t>модуль для работы со временем в </a:t>
+            </a:r>
+            <a:r>
+              <a:rPr lang="en-US" sz="2000" dirty="0" smtClean="0">
+                <a:latin typeface="Calibri" panose="020F0502020204030204" pitchFamily="34" charset="0"/>
+                <a:cs typeface="Calibri" panose="020F0502020204030204" pitchFamily="34" charset="0"/>
+              </a:rPr>
+              <a:t>Python.</a:t>
+            </a:r>
+          </a:p>
+          <a:p>
+            <a:pPr marL="0" indent="0">
+              <a:buNone/>
+            </a:pPr>
+            <a:r>
+              <a:rPr lang="en-US" sz="2000" b="1" dirty="0" smtClean="0">
+                <a:latin typeface="Calibri" panose="020F0502020204030204" pitchFamily="34" charset="0"/>
+                <a:cs typeface="Calibri" panose="020F0502020204030204" pitchFamily="34" charset="0"/>
+              </a:rPr>
+              <a:t>csv</a:t>
+            </a:r>
+            <a:r>
+              <a:rPr lang="en-US" sz="2000" dirty="0" smtClean="0">
+                <a:latin typeface="Calibri" panose="020F0502020204030204" pitchFamily="34" charset="0"/>
+                <a:cs typeface="Calibri" panose="020F0502020204030204" pitchFamily="34" charset="0"/>
+              </a:rPr>
+              <a:t> –</a:t>
             </a:r>
             <a:r>
               <a:rPr lang="ru-RU" sz="2000" dirty="0" smtClean="0">
                 <a:latin typeface="Calibri" panose="020F0502020204030204" pitchFamily="34" charset="0"/>
                 <a:cs typeface="Calibri" panose="020F0502020204030204" pitchFamily="34" charset="0"/>
               </a:rPr>
-              <a:t>ого</a:t>
+              <a:t> модуль для работы с </a:t>
+            </a:r>
+            <a:r>
+              <a:rPr lang="en-US" sz="2000" dirty="0" smtClean="0">
+                <a:latin typeface="Calibri" panose="020F0502020204030204" pitchFamily="34" charset="0"/>
+                <a:cs typeface="Calibri" panose="020F0502020204030204" pitchFamily="34" charset="0"/>
+              </a:rPr>
+              <a:t>csv </a:t>
             </a:r>
             <a:r>
               <a:rPr lang="ru-RU" sz="2000" dirty="0" smtClean="0">
                 <a:latin typeface="Calibri" panose="020F0502020204030204" pitchFamily="34" charset="0"/>
                 <a:cs typeface="Calibri" panose="020F0502020204030204" pitchFamily="34" charset="0"/>
               </a:rPr>
-              <a:t> индикатора </a:t>
+              <a:t>файлами в </a:t>
+            </a:r>
+            <a:r>
+              <a:rPr lang="en-US" sz="2000" dirty="0" smtClean="0">
+                <a:latin typeface="Calibri" panose="020F0502020204030204" pitchFamily="34" charset="0"/>
+                <a:cs typeface="Calibri" panose="020F0502020204030204" pitchFamily="34" charset="0"/>
+              </a:rPr>
+              <a:t>Python. </a:t>
+            </a:r>
+          </a:p>
+          <a:p>
+            <a:pPr marL="0" indent="0">
+              <a:buNone/>
+            </a:pPr>
+            <a:r>
+              <a:rPr lang="en-US" sz="2000" b="1" dirty="0" smtClean="0">
+                <a:latin typeface="Calibri" panose="020F0502020204030204" pitchFamily="34" charset="0"/>
+                <a:cs typeface="Calibri" panose="020F0502020204030204" pitchFamily="34" charset="0"/>
+              </a:rPr>
+              <a:t>os</a:t>
+            </a:r>
+            <a:r>
+              <a:rPr lang="en-US" sz="2000" dirty="0" smtClean="0">
+                <a:latin typeface="Calibri" panose="020F0502020204030204" pitchFamily="34" charset="0"/>
+                <a:cs typeface="Calibri" panose="020F0502020204030204" pitchFamily="34" charset="0"/>
+              </a:rPr>
+              <a:t> – </a:t>
             </a:r>
             <a:r>
               <a:rPr lang="ru-RU" sz="2000" dirty="0" smtClean="0">
                 <a:latin typeface="Calibri" panose="020F0502020204030204" pitchFamily="34" charset="0"/>
                 <a:cs typeface="Calibri" panose="020F0502020204030204" pitchFamily="34" charset="0"/>
               </a:rPr>
-              <a:t>выполнения</a:t>
-            </a:r>
-            <a:r>
-              <a:rPr lang="en-US" sz="2000" dirty="0" smtClean="0">
-                <a:latin typeface="Calibri" panose="020F0502020204030204" pitchFamily="34" charset="0"/>
-                <a:cs typeface="Calibri" panose="020F0502020204030204" pitchFamily="34" charset="0"/>
-              </a:rPr>
-              <a:t>.</a:t>
-            </a:r>
-          </a:p>
-          <a:p>
-            <a:pPr marL="0" indent="0">
-              <a:buNone/>
-            </a:pPr>
-            <a:r>
-              <a:rPr lang="en-US" sz="2000" b="1" dirty="0">
-                <a:latin typeface="Calibri" panose="020F0502020204030204" pitchFamily="34" charset="0"/>
-                <a:cs typeface="Calibri" panose="020F0502020204030204" pitchFamily="34" charset="0"/>
-              </a:rPr>
-              <a:t>t</a:t>
-            </a:r>
-            <a:r>
-              <a:rPr lang="en-US" sz="2000" b="1" dirty="0" smtClean="0">
-                <a:latin typeface="Calibri" panose="020F0502020204030204" pitchFamily="34" charset="0"/>
-                <a:cs typeface="Calibri" panose="020F0502020204030204" pitchFamily="34" charset="0"/>
-              </a:rPr>
-              <a:t>ime </a:t>
-            </a:r>
-            <a:r>
-              <a:rPr lang="en-US" sz="2000" dirty="0" smtClean="0">
-                <a:latin typeface="Calibri" panose="020F0502020204030204" pitchFamily="34" charset="0"/>
-                <a:cs typeface="Calibri" panose="020F0502020204030204" pitchFamily="34" charset="0"/>
-              </a:rPr>
-              <a:t>– </a:t>
+              <a:t>модуль для работы с операционной </a:t>
             </a:r>
             <a:r>
               <a:rPr lang="ru-RU" sz="2000" dirty="0" smtClean="0">
                 <a:latin typeface="Calibri" panose="020F0502020204030204" pitchFamily="34" charset="0"/>
                 <a:cs typeface="Calibri" panose="020F0502020204030204" pitchFamily="34" charset="0"/>
               </a:rPr>
-              <a:t>модуль для работы со временем в </a:t>
-            </a:r>
-            <a:r>
-              <a:rPr lang="en-US" sz="2000" dirty="0" smtClean="0">
-                <a:latin typeface="Calibri" panose="020F0502020204030204" pitchFamily="34" charset="0"/>
-                <a:cs typeface="Calibri" panose="020F0502020204030204" pitchFamily="34" charset="0"/>
-              </a:rPr>
-              <a:t>Python.</a:t>
-            </a:r>
-          </a:p>
-          <a:p>
-            <a:pPr marL="0" indent="0">
-              <a:buNone/>
-            </a:pPr>
-            <a:r>
-              <a:rPr lang="en-US" sz="2000" b="1" dirty="0" smtClean="0">
-                <a:latin typeface="Calibri" panose="020F0502020204030204" pitchFamily="34" charset="0"/>
-                <a:cs typeface="Calibri" panose="020F0502020204030204" pitchFamily="34" charset="0"/>
-              </a:rPr>
-              <a:t>csv</a:t>
-            </a:r>
-            <a:r>
-              <a:rPr lang="en-US" sz="2000" dirty="0" smtClean="0">
-                <a:latin typeface="Calibri" panose="020F0502020204030204" pitchFamily="34" charset="0"/>
-                <a:cs typeface="Calibri" panose="020F0502020204030204" pitchFamily="34" charset="0"/>
-              </a:rPr>
-              <a:t> –</a:t>
-            </a:r>
-            <a:r>
-              <a:rPr lang="ru-RU" sz="2000" dirty="0" smtClean="0">
-                <a:latin typeface="Calibri" panose="020F0502020204030204" pitchFamily="34" charset="0"/>
-                <a:cs typeface="Calibri" panose="020F0502020204030204" pitchFamily="34" charset="0"/>
-              </a:rPr>
-              <a:t> модуль для работы с </a:t>
-            </a:r>
-            <a:r>
-              <a:rPr lang="en-US" sz="2000" dirty="0" smtClean="0">
-                <a:latin typeface="Calibri" panose="020F0502020204030204" pitchFamily="34" charset="0"/>
-                <a:cs typeface="Calibri" panose="020F0502020204030204" pitchFamily="34" charset="0"/>
-              </a:rPr>
-              <a:t>csv </a:t>
-            </a:r>
-            <a:r>
-              <a:rPr lang="ru-RU" sz="2000" dirty="0" smtClean="0">
-                <a:latin typeface="Calibri" panose="020F0502020204030204" pitchFamily="34" charset="0"/>
-                <a:cs typeface="Calibri" panose="020F0502020204030204" pitchFamily="34" charset="0"/>
-              </a:rPr>
-              <a:t>файлами в </a:t>
-            </a:r>
-            <a:r>
-              <a:rPr lang="en-US" sz="2000" dirty="0" smtClean="0">
-                <a:latin typeface="Calibri" panose="020F0502020204030204" pitchFamily="34" charset="0"/>
-                <a:cs typeface="Calibri" panose="020F0502020204030204" pitchFamily="34" charset="0"/>
-              </a:rPr>
-              <a:t>Python. </a:t>
-            </a:r>
-          </a:p>
-          <a:p>
-            <a:pPr marL="0" indent="0">
-              <a:buNone/>
-            </a:pPr>
-            <a:r>
-              <a:rPr lang="en-US" sz="2000" b="1" dirty="0" err="1" smtClean="0">
-                <a:latin typeface="Calibri" panose="020F0502020204030204" pitchFamily="34" charset="0"/>
-                <a:cs typeface="Calibri" panose="020F0502020204030204" pitchFamily="34" charset="0"/>
-              </a:rPr>
-              <a:t>os</a:t>
-            </a:r>
-            <a:r>
-              <a:rPr lang="en-US" sz="2000" dirty="0" smtClean="0">
-                <a:latin typeface="Calibri" panose="020F0502020204030204" pitchFamily="34" charset="0"/>
-                <a:cs typeface="Calibri" panose="020F0502020204030204" pitchFamily="34" charset="0"/>
-              </a:rPr>
-              <a:t> – </a:t>
-            </a:r>
-            <a:r>
-              <a:rPr lang="ru-RU" sz="2000" dirty="0" smtClean="0">
-                <a:latin typeface="Calibri" panose="020F0502020204030204" pitchFamily="34" charset="0"/>
-                <a:cs typeface="Calibri" panose="020F0502020204030204" pitchFamily="34" charset="0"/>
-              </a:rPr>
-              <a:t>модуль для работы с операционной системой.</a:t>
+              <a:t>системой (можно использовать для автоматического открытия файла после записи).</a:t>
             </a:r>
             <a:endParaRPr lang="ru-RU" sz="2000" dirty="0">
               <a:latin typeface="Calibri" panose="020F0502020204030204" pitchFamily="34" charset="0"/>
@@ -11172,35 +10598,7 @@
                 <a:latin typeface="Calibri" panose="020F0502020204030204" pitchFamily="34" charset="0"/>
                 <a:cs typeface="Calibri" panose="020F0502020204030204" pitchFamily="34" charset="0"/>
               </a:rPr>
-              <a:t>адрес веб-страницы для </a:t>
-            </a:r>
-            <a:r>
-              <a:rPr lang="ru-RU" dirty="0" err="1" smtClean="0">
-                <a:latin typeface="Calibri" panose="020F0502020204030204" pitchFamily="34" charset="0"/>
-                <a:cs typeface="Calibri" panose="020F0502020204030204" pitchFamily="34" charset="0"/>
-              </a:rPr>
-              <a:t>скрейпинга</a:t>
-            </a:r>
-            <a:r>
-              <a:rPr lang="ru-RU" dirty="0" smtClean="0">
-                <a:latin typeface="Calibri" panose="020F0502020204030204" pitchFamily="34" charset="0"/>
-                <a:cs typeface="Calibri" panose="020F0502020204030204" pitchFamily="34" charset="0"/>
-              </a:rPr>
-              <a:t>/</a:t>
-            </a:r>
-            <a:r>
-              <a:rPr lang="ru-RU" dirty="0" err="1" smtClean="0">
-                <a:latin typeface="Calibri" panose="020F0502020204030204" pitchFamily="34" charset="0"/>
-                <a:cs typeface="Calibri" panose="020F0502020204030204" pitchFamily="34" charset="0"/>
-              </a:rPr>
-              <a:t>парсинга</a:t>
-            </a:r>
-            <a:r>
-              <a:rPr lang="ru-RU" dirty="0" smtClean="0">
-                <a:latin typeface="Calibri" panose="020F0502020204030204" pitchFamily="34" charset="0"/>
-                <a:cs typeface="Calibri" panose="020F0502020204030204" pitchFamily="34" charset="0"/>
-              </a:rPr>
-              <a:t> (в данном случае указывается явно, но можно запросить у пользователя с помощью функции </a:t>
+              <a:t>адрес веб-страницы для скрейпинга/парсинга (в данном случае указывается явно, но можно запросить у пользователя с помощью функции </a:t>
             </a:r>
             <a:r>
               <a:rPr lang="en-US" dirty="0" smtClean="0">
@@ -11475,7 +10873,7 @@
               <a:t>Функция </a:t>
             </a:r>
             <a:r>
-              <a:rPr lang="en-US" sz="2000" b="1" dirty="0" err="1" smtClean="0">
+              <a:rPr lang="en-US" sz="2000" b="1" dirty="0" smtClean="0">
                 <a:latin typeface="Calibri" panose="020F0502020204030204" pitchFamily="34" charset="0"/>
                 <a:cs typeface="Calibri" panose="020F0502020204030204" pitchFamily="34" charset="0"/>
               </a:rPr>
@@ -11545,18 +10943,11 @@
               <a:t> (как если бы пользователь заходил на веб-страницу со своего компьютера) без каких-либо параметров (</a:t>
             </a:r>
             <a:r>
-              <a:rPr lang="en-US" sz="2000" dirty="0" err="1" smtClean="0">
-                <a:latin typeface="Calibri" panose="020F0502020204030204" pitchFamily="34" charset="0"/>
-                <a:cs typeface="Calibri" panose="020F0502020204030204" pitchFamily="34" charset="0"/>
-              </a:rPr>
-              <a:t>params</a:t>
-            </a:r>
-            <a:r>
               <a:rPr lang="en-US" sz="2000" dirty="0" smtClean="0">
                 <a:latin typeface="Calibri" panose="020F0502020204030204" pitchFamily="34" charset="0"/>
                 <a:cs typeface="Calibri" panose="020F0502020204030204" pitchFamily="34" charset="0"/>
               </a:rPr>
-              <a:t>) </a:t>
+              <a:t>params) </a:t>
             </a:r>
             <a:r>
               <a:rPr lang="ru-RU" sz="2000" dirty="0" smtClean="0">
@@ -11591,21 +10982,7 @@
                 <a:latin typeface="Calibri" panose="020F0502020204030204" pitchFamily="34" charset="0"/>
                 <a:cs typeface="Calibri" panose="020F0502020204030204" pitchFamily="34" charset="0"/>
               </a:rPr>
-              <a:t> (</a:t>
-            </a:r>
-            <a:r>
-              <a:rPr lang="ru-RU" sz="2000" dirty="0" err="1" smtClean="0">
-                <a:latin typeface="Calibri" panose="020F0502020204030204" pitchFamily="34" charset="0"/>
-                <a:cs typeface="Calibri" panose="020F0502020204030204" pitchFamily="34" charset="0"/>
-              </a:rPr>
-              <a:t>скрейпинг</a:t>
-            </a:r>
-            <a:r>
-              <a:rPr lang="ru-RU" sz="2000" dirty="0" smtClean="0">
-                <a:latin typeface="Calibri" panose="020F0502020204030204" pitchFamily="34" charset="0"/>
-                <a:cs typeface="Calibri" panose="020F0502020204030204" pitchFamily="34" charset="0"/>
-              </a:rPr>
-              <a:t> страницы)</a:t>
+              <a:t> (скрейпинг страницы)</a:t>
             </a:r>
             <a:r>
               <a:rPr lang="en-US" sz="2000" dirty="0" smtClean="0">
@@ -11676,7 +11053,7 @@
               <a:t>Функция </a:t>
             </a:r>
             <a:r>
-              <a:rPr lang="en-US" sz="2000" b="1" dirty="0" err="1" smtClean="0">
+              <a:rPr lang="en-US" sz="2000" b="1" dirty="0" smtClean="0">
                 <a:latin typeface="Calibri" panose="020F0502020204030204" pitchFamily="34" charset="0"/>
                 <a:cs typeface="Calibri" panose="020F0502020204030204" pitchFamily="34" charset="0"/>
               </a:rPr>
@@ -11697,18 +11074,11 @@
               <a:t>Beautiful Soup, </a:t>
             </a:r>
             <a:r>
-              <a:rPr lang="ru-RU" sz="2000" dirty="0" err="1" smtClean="0">
-                <a:latin typeface="Calibri" panose="020F0502020204030204" pitchFamily="34" charset="0"/>
-                <a:cs typeface="Calibri" panose="020F0502020204030204" pitchFamily="34" charset="0"/>
-              </a:rPr>
-              <a:t>парсит</a:t>
-            </a:r>
-            <a:r>
               <a:rPr lang="ru-RU" sz="2000" dirty="0" smtClean="0">
                 <a:latin typeface="Calibri" panose="020F0502020204030204" pitchFamily="34" charset="0"/>
                 <a:cs typeface="Calibri" panose="020F0502020204030204" pitchFamily="34" charset="0"/>
               </a:rPr>
-              <a:t> полученную </a:t>
+              <a:t>парсит полученную </a:t>
             </a:r>
             <a:r>
               <a:rPr lang="en-US" sz="2000" dirty="0" smtClean="0">

</xml_diff>

<commit_message>
finally file parser project
</commit_message>
<xml_diff>
--- a/scraping_parsing project/web scraping_parsing.pptx
+++ b/scraping_parsing project/web scraping_parsing.pptx
@@ -6776,14 +6776,7 @@
                 <a:latin typeface="Calibri" panose="020F0502020204030204" pitchFamily="34" charset="0"/>
                 <a:cs typeface="Calibri" panose="020F0502020204030204" pitchFamily="34" charset="0"/>
               </a:rPr>
-              <a:t> могут возникнуть ошибки из-за отсутствия данных о первоначальной кодировке </a:t>
-            </a:r>
-            <a:r>
-              <a:rPr lang="ru-RU" sz="1400" dirty="0" smtClean="0">
-                <a:latin typeface="Calibri" panose="020F0502020204030204" pitchFamily="34" charset="0"/>
-                <a:cs typeface="Calibri" panose="020F0502020204030204" pitchFamily="34" charset="0"/>
-              </a:rPr>
-              <a:t>текста </a:t>
+              <a:t> могут возникнуть ошибки из-за отсутствия данных о первоначальной кодировке текста </a:t>
             </a:r>
             <a:r>
               <a:rPr lang="en-US" sz="1400" dirty="0" smtClean="0">
@@ -8853,14 +8846,56 @@
                 <a:latin typeface="Calibri" panose="020F0502020204030204" pitchFamily="34" charset="0"/>
                 <a:cs typeface="Calibri" panose="020F0502020204030204" pitchFamily="34" charset="0"/>
               </a:rPr>
-              <a:t>parser </a:t>
+              <a:t>parser</a:t>
+            </a:r>
+            <a:r>
+              <a:rPr lang="ru-RU" sz="2000" i="1" dirty="0">
+                <a:latin typeface="Calibri" panose="020F0502020204030204" pitchFamily="34" charset="0"/>
+                <a:cs typeface="Calibri" panose="020F0502020204030204" pitchFamily="34" charset="0"/>
+              </a:rPr>
+              <a:t> </a:t>
             </a:r>
             <a:r>
               <a:rPr lang="ru-RU" sz="2000" i="1" dirty="0" smtClean="0">
                 <a:latin typeface="Calibri" panose="020F0502020204030204" pitchFamily="34" charset="0"/>
                 <a:cs typeface="Calibri" panose="020F0502020204030204" pitchFamily="34" charset="0"/>
               </a:rPr>
-              <a:t>в виду своей встроенности, приемлемой скорости работы и подходящей обработки </a:t>
+              <a:t>с</a:t>
+            </a:r>
+            <a:r>
+              <a:rPr lang="ru-RU" sz="2000" i="1" dirty="0" smtClean="0">
+                <a:latin typeface="Calibri" panose="020F0502020204030204" pitchFamily="34" charset="0"/>
+                <a:cs typeface="Calibri" panose="020F0502020204030204" pitchFamily="34" charset="0"/>
+              </a:rPr>
+              <a:t> </a:t>
+            </a:r>
+            <a:r>
+              <a:rPr lang="ru-RU" sz="2000" i="1" dirty="0" smtClean="0">
+                <a:latin typeface="Calibri" panose="020F0502020204030204" pitchFamily="34" charset="0"/>
+                <a:cs typeface="Calibri" panose="020F0502020204030204" pitchFamily="34" charset="0"/>
+              </a:rPr>
+              <a:t>приемлемой </a:t>
+            </a:r>
+            <a:r>
+              <a:rPr lang="ru-RU" sz="2000" i="1" dirty="0" smtClean="0">
+                <a:latin typeface="Calibri" panose="020F0502020204030204" pitchFamily="34" charset="0"/>
+                <a:cs typeface="Calibri" panose="020F0502020204030204" pitchFamily="34" charset="0"/>
+              </a:rPr>
+              <a:t>скоростью </a:t>
+            </a:r>
+            <a:r>
+              <a:rPr lang="ru-RU" sz="2000" i="1" dirty="0" smtClean="0">
+                <a:latin typeface="Calibri" panose="020F0502020204030204" pitchFamily="34" charset="0"/>
+                <a:cs typeface="Calibri" panose="020F0502020204030204" pitchFamily="34" charset="0"/>
+              </a:rPr>
+              <a:t>работы и подходящей </a:t>
+            </a:r>
+            <a:r>
+              <a:rPr lang="ru-RU" sz="2000" i="1" dirty="0" smtClean="0">
+                <a:latin typeface="Calibri" panose="020F0502020204030204" pitchFamily="34" charset="0"/>
+                <a:cs typeface="Calibri" panose="020F0502020204030204" pitchFamily="34" charset="0"/>
+              </a:rPr>
+              <a:t>обработкой </a:t>
             </a:r>
             <a:r>
               <a:rPr lang="en-US" sz="2000" i="1" dirty="0" smtClean="0">
@@ -10371,14 +10406,7 @@
                 <a:latin typeface="Calibri" panose="020F0502020204030204" pitchFamily="34" charset="0"/>
                 <a:cs typeface="Calibri" panose="020F0502020204030204" pitchFamily="34" charset="0"/>
               </a:rPr>
-              <a:t>модуль для работы с операционной </a:t>
-            </a:r>
-            <a:r>
-              <a:rPr lang="ru-RU" sz="2000" dirty="0" smtClean="0">
-                <a:latin typeface="Calibri" panose="020F0502020204030204" pitchFamily="34" charset="0"/>
-                <a:cs typeface="Calibri" panose="020F0502020204030204" pitchFamily="34" charset="0"/>
-              </a:rPr>
-              <a:t>системой (можно использовать для автоматического открытия файла после записи).</a:t>
+              <a:t>модуль для работы с операционной системой (можно использовать для автоматического открытия файла после записи).</a:t>
             </a:r>
             <a:endParaRPr lang="ru-RU" sz="2000" dirty="0">
               <a:latin typeface="Calibri" panose="020F0502020204030204" pitchFamily="34" charset="0"/>

</xml_diff>